<commit_message>
achieved 94% val_acc, now can save/load model
</commit_message>
<xml_diff>
--- a/ML Presentations/Convolutional Neural Networks Presentation.pptx
+++ b/ML Presentations/Convolutional Neural Networks Presentation.pptx
@@ -7,14 +7,18 @@
   <p:sldIdLst>
     <p:sldId id="256" r:id="rId2"/>
     <p:sldId id="257" r:id="rId3"/>
-    <p:sldId id="258" r:id="rId4"/>
-    <p:sldId id="259" r:id="rId5"/>
-    <p:sldId id="260" r:id="rId6"/>
-    <p:sldId id="262" r:id="rId7"/>
-    <p:sldId id="261" r:id="rId8"/>
-    <p:sldId id="263" r:id="rId9"/>
-    <p:sldId id="264" r:id="rId10"/>
-    <p:sldId id="265" r:id="rId11"/>
+    <p:sldId id="268" r:id="rId4"/>
+    <p:sldId id="258" r:id="rId5"/>
+    <p:sldId id="259" r:id="rId6"/>
+    <p:sldId id="266" r:id="rId7"/>
+    <p:sldId id="260" r:id="rId8"/>
+    <p:sldId id="262" r:id="rId9"/>
+    <p:sldId id="269" r:id="rId10"/>
+    <p:sldId id="261" r:id="rId11"/>
+    <p:sldId id="267" r:id="rId12"/>
+    <p:sldId id="263" r:id="rId13"/>
+    <p:sldId id="264" r:id="rId14"/>
+    <p:sldId id="265" r:id="rId15"/>
   </p:sldIdLst>
   <p:sldSz cx="12192000" cy="6858000"/>
   <p:notesSz cx="6858000" cy="9144000"/>
@@ -119,10 +123,6 @@
     </p:ext>
   </p:extLst>
 </p:presentation>
-</file>
-
-<file path=ppt/revisionInfo.xml><?xml version="1.0" encoding="utf-8"?>
-<p1510:revInfo xmlns:a="http://schemas.openxmlformats.org/drawingml/2006/main" xmlns:r="http://schemas.openxmlformats.org/officeDocument/2006/relationships" xmlns:p1510="http://schemas.microsoft.com/office/powerpoint/2015/10/main"/>
 </file>
 
 <file path=ppt/diagrams/colors1.xml><?xml version="1.0" encoding="utf-8"?>
@@ -3429,7 +3429,7 @@
           <a:p>
             <a:fld id="{4AAD347D-5ACD-4C99-B74B-A9C85AD731AF}" type="datetimeFigureOut">
               <a:rPr lang="en-US" dirty="0"/>
-              <a:t>7/13/2018</a:t>
+              <a:t>7/25/2018</a:t>
             </a:fld>
             <a:endParaRPr lang="en-US" dirty="0"/>
           </a:p>
@@ -3699,7 +3699,7 @@
           <a:p>
             <a:fld id="{4509A250-FF31-4206-8172-F9D3106AACB1}" type="datetimeFigureOut">
               <a:rPr lang="en-US" dirty="0"/>
-              <a:t>7/13/2018</a:t>
+              <a:t>7/25/2018</a:t>
             </a:fld>
             <a:endParaRPr lang="en-US" dirty="0"/>
           </a:p>
@@ -3888,7 +3888,7 @@
           <a:p>
             <a:fld id="{4509A250-FF31-4206-8172-F9D3106AACB1}" type="datetimeFigureOut">
               <a:rPr lang="en-US" dirty="0"/>
-              <a:t>7/13/2018</a:t>
+              <a:t>7/25/2018</a:t>
             </a:fld>
             <a:endParaRPr lang="en-US" dirty="0"/>
           </a:p>
@@ -4151,7 +4151,7 @@
           <a:p>
             <a:fld id="{4509A250-FF31-4206-8172-F9D3106AACB1}" type="datetimeFigureOut">
               <a:rPr lang="en-US" dirty="0"/>
-              <a:t>7/13/2018</a:t>
+              <a:t>7/25/2018</a:t>
             </a:fld>
             <a:endParaRPr lang="en-US" dirty="0"/>
           </a:p>
@@ -4478,7 +4478,7 @@
           <a:p>
             <a:fld id="{4509A250-FF31-4206-8172-F9D3106AACB1}" type="datetimeFigureOut">
               <a:rPr lang="en-US" dirty="0"/>
-              <a:t>7/13/2018</a:t>
+              <a:t>7/25/2018</a:t>
             </a:fld>
             <a:endParaRPr lang="en-US" dirty="0"/>
           </a:p>
@@ -5083,7 +5083,7 @@
           <a:p>
             <a:fld id="{4509A250-FF31-4206-8172-F9D3106AACB1}" type="datetimeFigureOut">
               <a:rPr lang="en-US" dirty="0"/>
-              <a:t>7/13/2018</a:t>
+              <a:t>7/25/2018</a:t>
             </a:fld>
             <a:endParaRPr lang="en-US" dirty="0"/>
           </a:p>
@@ -5925,7 +5925,7 @@
           <a:p>
             <a:fld id="{4509A250-FF31-4206-8172-F9D3106AACB1}" type="datetimeFigureOut">
               <a:rPr lang="en-US" dirty="0"/>
-              <a:t>7/13/2018</a:t>
+              <a:t>7/25/2018</a:t>
             </a:fld>
             <a:endParaRPr lang="en-US" dirty="0"/>
           </a:p>
@@ -6090,7 +6090,7 @@
           <a:p>
             <a:fld id="{4509A250-FF31-4206-8172-F9D3106AACB1}" type="datetimeFigureOut">
               <a:rPr lang="en-US" dirty="0"/>
-              <a:t>7/13/2018</a:t>
+              <a:t>7/25/2018</a:t>
             </a:fld>
             <a:endParaRPr lang="en-US" dirty="0"/>
           </a:p>
@@ -6265,7 +6265,7 @@
           <a:p>
             <a:fld id="{4509A250-FF31-4206-8172-F9D3106AACB1}" type="datetimeFigureOut">
               <a:rPr lang="en-US" dirty="0"/>
-              <a:t>7/13/2018</a:t>
+              <a:t>7/25/2018</a:t>
             </a:fld>
             <a:endParaRPr lang="en-US" dirty="0"/>
           </a:p>
@@ -6430,7 +6430,7 @@
           <a:p>
             <a:fld id="{4509A250-FF31-4206-8172-F9D3106AACB1}" type="datetimeFigureOut">
               <a:rPr lang="en-US" dirty="0"/>
-              <a:t>7/13/2018</a:t>
+              <a:t>7/25/2018</a:t>
             </a:fld>
             <a:endParaRPr lang="en-US" dirty="0"/>
           </a:p>
@@ -6669,7 +6669,7 @@
           <a:p>
             <a:fld id="{4509A250-FF31-4206-8172-F9D3106AACB1}" type="datetimeFigureOut">
               <a:rPr lang="en-US" dirty="0"/>
-              <a:t>7/13/2018</a:t>
+              <a:t>7/25/2018</a:t>
             </a:fld>
             <a:endParaRPr lang="en-US" dirty="0"/>
           </a:p>
@@ -6956,7 +6956,7 @@
           <a:p>
             <a:fld id="{4509A250-FF31-4206-8172-F9D3106AACB1}" type="datetimeFigureOut">
               <a:rPr lang="en-US" dirty="0"/>
-              <a:t>7/13/2018</a:t>
+              <a:t>7/25/2018</a:t>
             </a:fld>
             <a:endParaRPr lang="en-US" dirty="0"/>
           </a:p>
@@ -7389,7 +7389,7 @@
           <a:p>
             <a:fld id="{4509A250-FF31-4206-8172-F9D3106AACB1}" type="datetimeFigureOut">
               <a:rPr lang="en-US" dirty="0"/>
-              <a:t>7/13/2018</a:t>
+              <a:t>7/25/2018</a:t>
             </a:fld>
             <a:endParaRPr lang="en-US" dirty="0"/>
           </a:p>
@@ -7502,7 +7502,7 @@
           <a:p>
             <a:fld id="{4509A250-FF31-4206-8172-F9D3106AACB1}" type="datetimeFigureOut">
               <a:rPr lang="en-US" dirty="0"/>
-              <a:t>7/13/2018</a:t>
+              <a:t>7/25/2018</a:t>
             </a:fld>
             <a:endParaRPr lang="en-US" dirty="0"/>
           </a:p>
@@ -7592,7 +7592,7 @@
           <a:p>
             <a:fld id="{4509A250-FF31-4206-8172-F9D3106AACB1}" type="datetimeFigureOut">
               <a:rPr lang="en-US" dirty="0"/>
-              <a:t>7/13/2018</a:t>
+              <a:t>7/25/2018</a:t>
             </a:fld>
             <a:endParaRPr lang="en-US" dirty="0"/>
           </a:p>
@@ -7866,7 +7866,7 @@
           <a:p>
             <a:fld id="{4509A250-FF31-4206-8172-F9D3106AACB1}" type="datetimeFigureOut">
               <a:rPr lang="en-US" dirty="0"/>
-              <a:t>7/13/2018</a:t>
+              <a:t>7/25/2018</a:t>
             </a:fld>
             <a:endParaRPr lang="en-US" dirty="0"/>
           </a:p>
@@ -8136,7 +8136,7 @@
           <a:p>
             <a:fld id="{4509A250-FF31-4206-8172-F9D3106AACB1}" type="datetimeFigureOut">
               <a:rPr lang="en-US" dirty="0"/>
-              <a:t>7/13/2018</a:t>
+              <a:t>7/25/2018</a:t>
             </a:fld>
             <a:endParaRPr lang="en-US" dirty="0"/>
           </a:p>
@@ -8560,7 +8560,7 @@
           <a:p>
             <a:fld id="{4509A250-FF31-4206-8172-F9D3106AACB1}" type="datetimeFigureOut">
               <a:rPr lang="en-US" dirty="0"/>
-              <a:t>7/13/2018</a:t>
+              <a:t>7/25/2018</a:t>
             </a:fld>
             <a:endParaRPr lang="en-US" dirty="0"/>
           </a:p>
@@ -9164,6 +9164,1317 @@
           <p:cNvPr id="2" name="Title 1">
             <a:extLst>
               <a:ext uri="{FF2B5EF4-FFF2-40B4-BE49-F238E27FC236}">
+                <a16:creationId xmlns:a16="http://schemas.microsoft.com/office/drawing/2014/main" id="{C2B7A7A0-D3AA-4C42-9AE5-446818ED97EA}"/>
+              </a:ext>
+            </a:extLst>
+          </p:cNvPr>
+          <p:cNvSpPr>
+            <a:spLocks noGrp="1"/>
+          </p:cNvSpPr>
+          <p:nvPr>
+            <p:ph type="title"/>
+          </p:nvPr>
+        </p:nvSpPr>
+        <p:spPr/>
+        <p:txBody>
+          <a:bodyPr/>
+          <a:lstStyle/>
+          <a:p>
+            <a:r>
+              <a:rPr lang="en-US" dirty="0"/>
+              <a:t>A typical CNN</a:t>
+            </a:r>
+          </a:p>
+        </p:txBody>
+      </p:sp>
+      <p:pic>
+        <p:nvPicPr>
+          <p:cNvPr id="5122" name="Picture 2" descr="https://cs231n.github.io/assets/cnn/convnet.jpeg">
+            <a:extLst>
+              <a:ext uri="{FF2B5EF4-FFF2-40B4-BE49-F238E27FC236}">
+                <a16:creationId xmlns:a16="http://schemas.microsoft.com/office/drawing/2014/main" id="{8FE2454C-DFD6-4A89-ACE3-061C76EC15B9}"/>
+              </a:ext>
+            </a:extLst>
+          </p:cNvPr>
+          <p:cNvPicPr>
+            <a:picLocks noGrp="1" noChangeAspect="1" noChangeArrowheads="1"/>
+          </p:cNvPicPr>
+          <p:nvPr>
+            <p:ph idx="1"/>
+          </p:nvPr>
+        </p:nvPicPr>
+        <p:blipFill>
+          <a:blip r:embed="rId2">
+            <a:extLst>
+              <a:ext uri="{28A0092B-C50C-407E-A947-70E740481C1C}">
+                <a14:useLocalDpi xmlns:a14="http://schemas.microsoft.com/office/drawing/2010/main" val="0"/>
+              </a:ext>
+            </a:extLst>
+          </a:blip>
+          <a:srcRect/>
+          <a:stretch>
+            <a:fillRect/>
+          </a:stretch>
+        </p:blipFill>
+        <p:spPr bwMode="auto">
+          <a:xfrm>
+            <a:off x="1582202" y="1613612"/>
+            <a:ext cx="8761532" cy="4195762"/>
+          </a:xfrm>
+          <a:prstGeom prst="rect">
+            <a:avLst/>
+          </a:prstGeom>
+          <a:noFill/>
+          <a:extLst>
+            <a:ext uri="{909E8E84-426E-40DD-AFC4-6F175D3DCCD1}">
+              <a14:hiddenFill xmlns:a14="http://schemas.microsoft.com/office/drawing/2010/main">
+                <a:solidFill>
+                  <a:srgbClr val="FFFFFF"/>
+                </a:solidFill>
+              </a14:hiddenFill>
+            </a:ext>
+          </a:extLst>
+        </p:spPr>
+      </p:pic>
+      <p:sp>
+        <p:nvSpPr>
+          <p:cNvPr id="3" name="Rectangle 2">
+            <a:extLst>
+              <a:ext uri="{FF2B5EF4-FFF2-40B4-BE49-F238E27FC236}">
+                <a16:creationId xmlns:a16="http://schemas.microsoft.com/office/drawing/2014/main" id="{A7418C0C-EE12-4020-97BB-5E603ACCC7DD}"/>
+              </a:ext>
+            </a:extLst>
+          </p:cNvPr>
+          <p:cNvSpPr/>
+          <p:nvPr/>
+        </p:nvSpPr>
+        <p:spPr>
+          <a:xfrm>
+            <a:off x="3846964" y="6035950"/>
+            <a:ext cx="4863832" cy="369332"/>
+          </a:xfrm>
+          <a:prstGeom prst="rect">
+            <a:avLst/>
+          </a:prstGeom>
+        </p:spPr>
+        <p:txBody>
+          <a:bodyPr wrap="none">
+            <a:spAutoFit/>
+          </a:bodyPr>
+          <a:lstStyle/>
+          <a:p>
+            <a:r>
+              <a:rPr lang="en-US" dirty="0"/>
+              <a:t>scs.</a:t>
+            </a:r>
+            <a:r>
+              <a:rPr lang="en-US" dirty="0">
+                <a:hlinkClick r:id="rId3"/>
+              </a:rPr>
+              <a:t>ryerson</a:t>
+            </a:r>
+            <a:r>
+              <a:rPr lang="en-US" dirty="0"/>
+              <a:t>.ca/~</a:t>
+            </a:r>
+            <a:r>
+              <a:rPr lang="en-US" dirty="0" err="1"/>
+              <a:t>aharley</a:t>
+            </a:r>
+            <a:r>
+              <a:rPr lang="en-US" dirty="0"/>
+              <a:t>/vis/conv/flat.html</a:t>
+            </a:r>
+          </a:p>
+        </p:txBody>
+      </p:sp>
+    </p:spTree>
+    <p:extLst>
+      <p:ext uri="{BB962C8B-B14F-4D97-AF65-F5344CB8AC3E}">
+        <p14:creationId xmlns:p14="http://schemas.microsoft.com/office/powerpoint/2010/main" val="2603992973"/>
+      </p:ext>
+    </p:extLst>
+  </p:cSld>
+  <p:clrMapOvr>
+    <a:masterClrMapping/>
+  </p:clrMapOvr>
+</p:sld>
+</file>
+
+<file path=ppt/slides/slide11.xml><?xml version="1.0" encoding="utf-8"?>
+<p:sld xmlns:a="http://schemas.openxmlformats.org/drawingml/2006/main" xmlns:r="http://schemas.openxmlformats.org/officeDocument/2006/relationships" xmlns:p="http://schemas.openxmlformats.org/presentationml/2006/main">
+  <p:cSld>
+    <p:spTree>
+      <p:nvGrpSpPr>
+        <p:cNvPr id="1" name=""/>
+        <p:cNvGrpSpPr/>
+        <p:nvPr/>
+      </p:nvGrpSpPr>
+      <p:grpSpPr>
+        <a:xfrm>
+          <a:off x="0" y="0"/>
+          <a:ext cx="0" cy="0"/>
+          <a:chOff x="0" y="0"/>
+          <a:chExt cx="0" cy="0"/>
+        </a:xfrm>
+      </p:grpSpPr>
+      <p:sp>
+        <p:nvSpPr>
+          <p:cNvPr id="2" name="Title 1">
+            <a:extLst>
+              <a:ext uri="{FF2B5EF4-FFF2-40B4-BE49-F238E27FC236}">
+                <a16:creationId xmlns:a16="http://schemas.microsoft.com/office/drawing/2014/main" id="{68A82E50-E662-4D1E-87A4-ABC622361AFC}"/>
+              </a:ext>
+            </a:extLst>
+          </p:cNvPr>
+          <p:cNvSpPr>
+            <a:spLocks noGrp="1"/>
+          </p:cNvSpPr>
+          <p:nvPr>
+            <p:ph type="title"/>
+          </p:nvPr>
+        </p:nvSpPr>
+        <p:spPr/>
+        <p:txBody>
+          <a:bodyPr/>
+          <a:lstStyle/>
+          <a:p>
+            <a:r>
+              <a:rPr lang="en-US" dirty="0"/>
+              <a:t>Some fun examples of CNN’s</a:t>
+            </a:r>
+          </a:p>
+        </p:txBody>
+      </p:sp>
+      <p:sp>
+        <p:nvSpPr>
+          <p:cNvPr id="3" name="Content Placeholder 2">
+            <a:extLst>
+              <a:ext uri="{FF2B5EF4-FFF2-40B4-BE49-F238E27FC236}">
+                <a16:creationId xmlns:a16="http://schemas.microsoft.com/office/drawing/2014/main" id="{A892A2BB-C7CF-49BC-985A-9A942E96B9EA}"/>
+              </a:ext>
+            </a:extLst>
+          </p:cNvPr>
+          <p:cNvSpPr>
+            <a:spLocks noGrp="1"/>
+          </p:cNvSpPr>
+          <p:nvPr>
+            <p:ph idx="1"/>
+          </p:nvPr>
+        </p:nvSpPr>
+        <p:spPr/>
+        <p:txBody>
+          <a:bodyPr/>
+          <a:lstStyle/>
+          <a:p>
+            <a:r>
+              <a:rPr lang="en-US" dirty="0"/>
+              <a:t>How CNN’s see in the dark ( </a:t>
+            </a:r>
+            <a:r>
+              <a:rPr lang="en-US" dirty="0">
+                <a:hlinkClick r:id="rId2"/>
+              </a:rPr>
+              <a:t>link</a:t>
+            </a:r>
+            <a:r>
+              <a:rPr lang="en-US" dirty="0"/>
+              <a:t> )</a:t>
+            </a:r>
+          </a:p>
+          <a:p>
+            <a:endParaRPr lang="en-US" dirty="0"/>
+          </a:p>
+          <a:p>
+            <a:r>
+              <a:rPr lang="en-US" dirty="0"/>
+              <a:t>NVIDIA’s driving car ( </a:t>
+            </a:r>
+            <a:r>
+              <a:rPr lang="en-US" dirty="0">
+                <a:hlinkClick r:id="rId3"/>
+              </a:rPr>
+              <a:t>link</a:t>
+            </a:r>
+            <a:r>
+              <a:rPr lang="en-US" dirty="0"/>
+              <a:t> )</a:t>
+            </a:r>
+          </a:p>
+          <a:p>
+            <a:endParaRPr lang="en-US" dirty="0"/>
+          </a:p>
+          <a:p>
+            <a:endParaRPr lang="en-US" dirty="0"/>
+          </a:p>
+          <a:p>
+            <a:endParaRPr lang="en-US" dirty="0"/>
+          </a:p>
+        </p:txBody>
+      </p:sp>
+    </p:spTree>
+    <p:extLst>
+      <p:ext uri="{BB962C8B-B14F-4D97-AF65-F5344CB8AC3E}">
+        <p14:creationId xmlns:p14="http://schemas.microsoft.com/office/powerpoint/2010/main" val="3755644266"/>
+      </p:ext>
+    </p:extLst>
+  </p:cSld>
+  <p:clrMapOvr>
+    <a:masterClrMapping/>
+  </p:clrMapOvr>
+</p:sld>
+</file>
+
+<file path=ppt/slides/slide12.xml><?xml version="1.0" encoding="utf-8"?>
+<p:sld xmlns:a="http://schemas.openxmlformats.org/drawingml/2006/main" xmlns:r="http://schemas.openxmlformats.org/officeDocument/2006/relationships" xmlns:p="http://schemas.openxmlformats.org/presentationml/2006/main">
+  <p:cSld>
+    <p:bg>
+      <p:bgPr>
+        <a:blipFill rotWithShape="1">
+          <a:blip r:embed="rId2">
+            <a:duotone>
+              <a:schemeClr val="bg2">
+                <a:shade val="62000"/>
+                <a:hueMod val="108000"/>
+                <a:satMod val="164000"/>
+                <a:lumMod val="69000"/>
+              </a:schemeClr>
+              <a:schemeClr val="bg2">
+                <a:tint val="96000"/>
+                <a:hueMod val="90000"/>
+                <a:satMod val="130000"/>
+                <a:lumMod val="134000"/>
+              </a:schemeClr>
+            </a:duotone>
+            <a:extLst/>
+          </a:blip>
+          <a:stretch/>
+        </a:blipFill>
+        <a:effectLst/>
+      </p:bgPr>
+    </p:bg>
+    <p:spTree>
+      <p:nvGrpSpPr>
+        <p:cNvPr id="1" name=""/>
+        <p:cNvGrpSpPr/>
+        <p:nvPr/>
+      </p:nvGrpSpPr>
+      <p:grpSpPr>
+        <a:xfrm>
+          <a:off x="0" y="0"/>
+          <a:ext cx="0" cy="0"/>
+          <a:chOff x="0" y="0"/>
+          <a:chExt cx="0" cy="0"/>
+        </a:xfrm>
+      </p:grpSpPr>
+      <p:sp>
+        <p:nvSpPr>
+          <p:cNvPr id="2" name="Title 1">
+            <a:extLst>
+              <a:ext uri="{FF2B5EF4-FFF2-40B4-BE49-F238E27FC236}">
+                <a16:creationId xmlns:a16="http://schemas.microsoft.com/office/drawing/2014/main" id="{BF64BB4E-0027-41C8-80F9-D4450C0CC1DA}"/>
+              </a:ext>
+            </a:extLst>
+          </p:cNvPr>
+          <p:cNvSpPr>
+            <a:spLocks noGrp="1"/>
+          </p:cNvSpPr>
+          <p:nvPr>
+            <p:ph type="title"/>
+          </p:nvPr>
+        </p:nvSpPr>
+        <p:spPr>
+          <a:xfrm>
+            <a:off x="646112" y="452718"/>
+            <a:ext cx="5629222" cy="1400530"/>
+          </a:xfrm>
+        </p:spPr>
+        <p:txBody>
+          <a:bodyPr>
+            <a:normAutofit/>
+          </a:bodyPr>
+          <a:lstStyle/>
+          <a:p>
+            <a:r>
+              <a:rPr lang="en-US" dirty="0" err="1"/>
+              <a:t>TensorFlow</a:t>
+            </a:r>
+            <a:r>
+              <a:rPr lang="en-US" dirty="0"/>
+              <a:t> and </a:t>
+            </a:r>
+            <a:r>
+              <a:rPr lang="en-US" dirty="0" err="1"/>
+              <a:t>Keras</a:t>
+            </a:r>
+            <a:endParaRPr lang="en-US" dirty="0"/>
+          </a:p>
+        </p:txBody>
+      </p:sp>
+      <p:sp>
+        <p:nvSpPr>
+          <p:cNvPr id="73" name="Freeform 7">
+            <a:extLst>
+              <a:ext uri="{FF2B5EF4-FFF2-40B4-BE49-F238E27FC236}">
+                <a16:creationId xmlns:a16="http://schemas.microsoft.com/office/drawing/2014/main" id="{053E741A-7A7D-46A0-ACB7-0736C3293471}"/>
+              </a:ext>
+              <a:ext uri="{C183D7F6-B498-43B3-948B-1728B52AA6E4}">
+                <adec:decorative xmlns:adec="http://schemas.microsoft.com/office/drawing/2017/decorative" val="1"/>
+              </a:ext>
+            </a:extLst>
+          </p:cNvPr>
+          <p:cNvSpPr>
+            <a:spLocks noGrp="1" noRot="1" noChangeAspect="1" noMove="1" noResize="1" noEditPoints="1" noAdjustHandles="1" noChangeArrowheads="1" noChangeShapeType="1" noTextEdit="1"/>
+          </p:cNvSpPr>
+          <p:nvPr>
+            <p:extLst>
+              <p:ext uri="{386F3935-93C4-4BCD-93E2-E3B085C9AB24}">
+                <p16:designElem xmlns:p16="http://schemas.microsoft.com/office/powerpoint/2015/main" val="1"/>
+              </p:ext>
+            </p:extLst>
+          </p:nvPr>
+        </p:nvSpPr>
+        <p:spPr>
+          <a:xfrm>
+            <a:off x="6449843" y="-1"/>
+            <a:ext cx="559472" cy="3709642"/>
+          </a:xfrm>
+          <a:custGeom>
+            <a:avLst/>
+            <a:gdLst>
+              <a:gd name="connsiteX0" fmla="*/ 0 w 559472"/>
+              <a:gd name="connsiteY0" fmla="*/ 0 h 3709642"/>
+              <a:gd name="connsiteX1" fmla="*/ 473952 w 559472"/>
+              <a:gd name="connsiteY1" fmla="*/ 0 h 3709642"/>
+              <a:gd name="connsiteX2" fmla="*/ 485840 w 559472"/>
+              <a:gd name="connsiteY2" fmla="*/ 161194 h 3709642"/>
+              <a:gd name="connsiteX3" fmla="*/ 523949 w 559472"/>
+              <a:gd name="connsiteY3" fmla="*/ 3672197 h 3709642"/>
+              <a:gd name="connsiteX4" fmla="*/ 454748 w 559472"/>
+              <a:gd name="connsiteY4" fmla="*/ 3709642 h 3709642"/>
+              <a:gd name="connsiteX5" fmla="*/ 448224 w 559472"/>
+              <a:gd name="connsiteY5" fmla="*/ 3510471 h 3709642"/>
+              <a:gd name="connsiteX6" fmla="*/ 443564 w 559472"/>
+              <a:gd name="connsiteY6" fmla="*/ 3408563 h 3709642"/>
+              <a:gd name="connsiteX7" fmla="*/ 438902 w 559472"/>
+              <a:gd name="connsiteY7" fmla="*/ 3304407 h 3709642"/>
+              <a:gd name="connsiteX8" fmla="*/ 433941 w 559472"/>
+              <a:gd name="connsiteY8" fmla="*/ 3198777 h 3709642"/>
+              <a:gd name="connsiteX9" fmla="*/ 427584 w 559472"/>
+              <a:gd name="connsiteY9" fmla="*/ 3092510 h 3709642"/>
+              <a:gd name="connsiteX10" fmla="*/ 420988 w 559472"/>
+              <a:gd name="connsiteY10" fmla="*/ 2984390 h 3709642"/>
+              <a:gd name="connsiteX11" fmla="*/ 414330 w 559472"/>
+              <a:gd name="connsiteY11" fmla="*/ 2874401 h 3709642"/>
+              <a:gd name="connsiteX12" fmla="*/ 406840 w 559472"/>
+              <a:gd name="connsiteY12" fmla="*/ 2762980 h 3709642"/>
+              <a:gd name="connsiteX13" fmla="*/ 397745 w 559472"/>
+              <a:gd name="connsiteY13" fmla="*/ 2650566 h 3709642"/>
+              <a:gd name="connsiteX14" fmla="*/ 389154 w 559472"/>
+              <a:gd name="connsiteY14" fmla="*/ 2536612 h 3709642"/>
+              <a:gd name="connsiteX15" fmla="*/ 379225 w 559472"/>
+              <a:gd name="connsiteY15" fmla="*/ 2421642 h 3709642"/>
+              <a:gd name="connsiteX16" fmla="*/ 368316 w 559472"/>
+              <a:gd name="connsiteY16" fmla="*/ 2305627 h 3709642"/>
+              <a:gd name="connsiteX17" fmla="*/ 357466 w 559472"/>
+              <a:gd name="connsiteY17" fmla="*/ 2189233 h 3709642"/>
+              <a:gd name="connsiteX18" fmla="*/ 344982 w 559472"/>
+              <a:gd name="connsiteY18" fmla="*/ 2071473 h 3709642"/>
+              <a:gd name="connsiteX19" fmla="*/ 332466 w 559472"/>
+              <a:gd name="connsiteY19" fmla="*/ 1952216 h 3709642"/>
+              <a:gd name="connsiteX20" fmla="*/ 319121 w 559472"/>
+              <a:gd name="connsiteY20" fmla="*/ 1833776 h 3709642"/>
+              <a:gd name="connsiteX21" fmla="*/ 304408 w 559472"/>
+              <a:gd name="connsiteY21" fmla="*/ 1713948 h 3709642"/>
+              <a:gd name="connsiteX22" fmla="*/ 288685 w 559472"/>
+              <a:gd name="connsiteY22" fmla="*/ 1592703 h 3709642"/>
+              <a:gd name="connsiteX23" fmla="*/ 273050 w 559472"/>
+              <a:gd name="connsiteY23" fmla="*/ 1471451 h 3709642"/>
+              <a:gd name="connsiteX24" fmla="*/ 255813 w 559472"/>
+              <a:gd name="connsiteY24" fmla="*/ 1350328 h 3709642"/>
+              <a:gd name="connsiteX25" fmla="*/ 237060 w 559472"/>
+              <a:gd name="connsiteY25" fmla="*/ 1227080 h 3709642"/>
+              <a:gd name="connsiteX26" fmla="*/ 218488 w 559472"/>
+              <a:gd name="connsiteY26" fmla="*/ 1106065 h 3709642"/>
+              <a:gd name="connsiteX27" fmla="*/ 198221 w 559472"/>
+              <a:gd name="connsiteY27" fmla="*/ 982940 h 3709642"/>
+              <a:gd name="connsiteX28" fmla="*/ 177152 w 559472"/>
+              <a:gd name="connsiteY28" fmla="*/ 858755 h 3709642"/>
+              <a:gd name="connsiteX29" fmla="*/ 155551 w 559472"/>
+              <a:gd name="connsiteY29" fmla="*/ 736861 h 3709642"/>
+              <a:gd name="connsiteX30" fmla="*/ 131782 w 559472"/>
+              <a:gd name="connsiteY30" fmla="*/ 613645 h 3709642"/>
+              <a:gd name="connsiteX31" fmla="*/ 107123 w 559472"/>
+              <a:gd name="connsiteY31" fmla="*/ 490500 h 3709642"/>
+              <a:gd name="connsiteX32" fmla="*/ 82552 w 559472"/>
+              <a:gd name="connsiteY32" fmla="*/ 367348 h 3709642"/>
+              <a:gd name="connsiteX33" fmla="*/ 55608 w 559472"/>
+              <a:gd name="connsiteY33" fmla="*/ 244762 h 3709642"/>
+              <a:gd name="connsiteX34" fmla="*/ 28130 w 559472"/>
+              <a:gd name="connsiteY34" fmla="*/ 122220 h 3709642"/>
+              <a:gd name="connsiteX35" fmla="*/ 0 w 559472"/>
+              <a:gd name="connsiteY35" fmla="*/ 0 h 3709642"/>
+            </a:gdLst>
+            <a:ahLst/>
+            <a:cxnLst>
+              <a:cxn ang="0">
+                <a:pos x="connsiteX0" y="connsiteY0"/>
+              </a:cxn>
+              <a:cxn ang="0">
+                <a:pos x="connsiteX1" y="connsiteY1"/>
+              </a:cxn>
+              <a:cxn ang="0">
+                <a:pos x="connsiteX2" y="connsiteY2"/>
+              </a:cxn>
+              <a:cxn ang="0">
+                <a:pos x="connsiteX3" y="connsiteY3"/>
+              </a:cxn>
+              <a:cxn ang="0">
+                <a:pos x="connsiteX4" y="connsiteY4"/>
+              </a:cxn>
+              <a:cxn ang="0">
+                <a:pos x="connsiteX5" y="connsiteY5"/>
+              </a:cxn>
+              <a:cxn ang="0">
+                <a:pos x="connsiteX6" y="connsiteY6"/>
+              </a:cxn>
+              <a:cxn ang="0">
+                <a:pos x="connsiteX7" y="connsiteY7"/>
+              </a:cxn>
+              <a:cxn ang="0">
+                <a:pos x="connsiteX8" y="connsiteY8"/>
+              </a:cxn>
+              <a:cxn ang="0">
+                <a:pos x="connsiteX9" y="connsiteY9"/>
+              </a:cxn>
+              <a:cxn ang="0">
+                <a:pos x="connsiteX10" y="connsiteY10"/>
+              </a:cxn>
+              <a:cxn ang="0">
+                <a:pos x="connsiteX11" y="connsiteY11"/>
+              </a:cxn>
+              <a:cxn ang="0">
+                <a:pos x="connsiteX12" y="connsiteY12"/>
+              </a:cxn>
+              <a:cxn ang="0">
+                <a:pos x="connsiteX13" y="connsiteY13"/>
+              </a:cxn>
+              <a:cxn ang="0">
+                <a:pos x="connsiteX14" y="connsiteY14"/>
+              </a:cxn>
+              <a:cxn ang="0">
+                <a:pos x="connsiteX15" y="connsiteY15"/>
+              </a:cxn>
+              <a:cxn ang="0">
+                <a:pos x="connsiteX16" y="connsiteY16"/>
+              </a:cxn>
+              <a:cxn ang="0">
+                <a:pos x="connsiteX17" y="connsiteY17"/>
+              </a:cxn>
+              <a:cxn ang="0">
+                <a:pos x="connsiteX18" y="connsiteY18"/>
+              </a:cxn>
+              <a:cxn ang="0">
+                <a:pos x="connsiteX19" y="connsiteY19"/>
+              </a:cxn>
+              <a:cxn ang="0">
+                <a:pos x="connsiteX20" y="connsiteY20"/>
+              </a:cxn>
+              <a:cxn ang="0">
+                <a:pos x="connsiteX21" y="connsiteY21"/>
+              </a:cxn>
+              <a:cxn ang="0">
+                <a:pos x="connsiteX22" y="connsiteY22"/>
+              </a:cxn>
+              <a:cxn ang="0">
+                <a:pos x="connsiteX23" y="connsiteY23"/>
+              </a:cxn>
+              <a:cxn ang="0">
+                <a:pos x="connsiteX24" y="connsiteY24"/>
+              </a:cxn>
+              <a:cxn ang="0">
+                <a:pos x="connsiteX25" y="connsiteY25"/>
+              </a:cxn>
+              <a:cxn ang="0">
+                <a:pos x="connsiteX26" y="connsiteY26"/>
+              </a:cxn>
+              <a:cxn ang="0">
+                <a:pos x="connsiteX27" y="connsiteY27"/>
+              </a:cxn>
+              <a:cxn ang="0">
+                <a:pos x="connsiteX28" y="connsiteY28"/>
+              </a:cxn>
+              <a:cxn ang="0">
+                <a:pos x="connsiteX29" y="connsiteY29"/>
+              </a:cxn>
+              <a:cxn ang="0">
+                <a:pos x="connsiteX30" y="connsiteY30"/>
+              </a:cxn>
+              <a:cxn ang="0">
+                <a:pos x="connsiteX31" y="connsiteY31"/>
+              </a:cxn>
+              <a:cxn ang="0">
+                <a:pos x="connsiteX32" y="connsiteY32"/>
+              </a:cxn>
+              <a:cxn ang="0">
+                <a:pos x="connsiteX33" y="connsiteY33"/>
+              </a:cxn>
+              <a:cxn ang="0">
+                <a:pos x="connsiteX34" y="connsiteY34"/>
+              </a:cxn>
+              <a:cxn ang="0">
+                <a:pos x="connsiteX35" y="connsiteY35"/>
+              </a:cxn>
+            </a:cxnLst>
+            <a:rect l="l" t="t" r="r" b="b"/>
+            <a:pathLst>
+              <a:path w="559472" h="3709642">
+                <a:moveTo>
+                  <a:pt x="0" y="0"/>
+                </a:moveTo>
+                <a:lnTo>
+                  <a:pt x="473952" y="0"/>
+                </a:lnTo>
+                <a:lnTo>
+                  <a:pt x="485840" y="161194"/>
+                </a:lnTo>
+                <a:cubicBezTo>
+                  <a:pt x="552063" y="1147770"/>
+                  <a:pt x="592441" y="3086737"/>
+                  <a:pt x="523949" y="3672197"/>
+                </a:cubicBezTo>
+                <a:cubicBezTo>
+                  <a:pt x="500842" y="3684557"/>
+                  <a:pt x="477855" y="3697282"/>
+                  <a:pt x="454748" y="3709642"/>
+                </a:cubicBezTo>
+                <a:lnTo>
+                  <a:pt x="448224" y="3510471"/>
+                </a:lnTo>
+                <a:lnTo>
+                  <a:pt x="443564" y="3408563"/>
+                </a:lnTo>
+                <a:lnTo>
+                  <a:pt x="438902" y="3304407"/>
+                </a:lnTo>
+                <a:lnTo>
+                  <a:pt x="433941" y="3198777"/>
+                </a:lnTo>
+                <a:lnTo>
+                  <a:pt x="427584" y="3092510"/>
+                </a:lnTo>
+                <a:lnTo>
+                  <a:pt x="420988" y="2984390"/>
+                </a:lnTo>
+                <a:lnTo>
+                  <a:pt x="414330" y="2874401"/>
+                </a:lnTo>
+                <a:lnTo>
+                  <a:pt x="406840" y="2762980"/>
+                </a:lnTo>
+                <a:lnTo>
+                  <a:pt x="397745" y="2650566"/>
+                </a:lnTo>
+                <a:lnTo>
+                  <a:pt x="389154" y="2536612"/>
+                </a:lnTo>
+                <a:lnTo>
+                  <a:pt x="379225" y="2421642"/>
+                </a:lnTo>
+                <a:lnTo>
+                  <a:pt x="368316" y="2305627"/>
+                </a:lnTo>
+                <a:lnTo>
+                  <a:pt x="357466" y="2189233"/>
+                </a:lnTo>
+                <a:lnTo>
+                  <a:pt x="344982" y="2071473"/>
+                </a:lnTo>
+                <a:lnTo>
+                  <a:pt x="332466" y="1952216"/>
+                </a:lnTo>
+                <a:lnTo>
+                  <a:pt x="319121" y="1833776"/>
+                </a:lnTo>
+                <a:lnTo>
+                  <a:pt x="304408" y="1713948"/>
+                </a:lnTo>
+                <a:lnTo>
+                  <a:pt x="288685" y="1592703"/>
+                </a:lnTo>
+                <a:lnTo>
+                  <a:pt x="273050" y="1471451"/>
+                </a:lnTo>
+                <a:lnTo>
+                  <a:pt x="255813" y="1350328"/>
+                </a:lnTo>
+                <a:lnTo>
+                  <a:pt x="237060" y="1227080"/>
+                </a:lnTo>
+                <a:lnTo>
+                  <a:pt x="218488" y="1106065"/>
+                </a:lnTo>
+                <a:lnTo>
+                  <a:pt x="198221" y="982940"/>
+                </a:lnTo>
+                <a:lnTo>
+                  <a:pt x="177152" y="858755"/>
+                </a:lnTo>
+                <a:lnTo>
+                  <a:pt x="155551" y="736861"/>
+                </a:lnTo>
+                <a:lnTo>
+                  <a:pt x="131782" y="613645"/>
+                </a:lnTo>
+                <a:lnTo>
+                  <a:pt x="107123" y="490500"/>
+                </a:lnTo>
+                <a:lnTo>
+                  <a:pt x="82552" y="367348"/>
+                </a:lnTo>
+                <a:lnTo>
+                  <a:pt x="55608" y="244762"/>
+                </a:lnTo>
+                <a:lnTo>
+                  <a:pt x="28130" y="122220"/>
+                </a:lnTo>
+                <a:lnTo>
+                  <a:pt x="0" y="0"/>
+                </a:lnTo>
+                <a:close/>
+              </a:path>
+            </a:pathLst>
+          </a:custGeom>
+          <a:solidFill>
+            <a:schemeClr val="tx1">
+              <a:alpha val="20000"/>
+            </a:schemeClr>
+          </a:solidFill>
+          <a:ln>
+            <a:noFill/>
+          </a:ln>
+        </p:spPr>
+        <p:txBody>
+          <a:bodyPr rtlCol="0" anchor="ctr"/>
+          <a:lstStyle/>
+          <a:p>
+            <a:pPr algn="ctr"/>
+            <a:endParaRPr lang="en-US"/>
+          </a:p>
+        </p:txBody>
+      </p:sp>
+      <p:sp>
+        <p:nvSpPr>
+          <p:cNvPr id="75" name="Rectangle 74">
+            <a:extLst>
+              <a:ext uri="{FF2B5EF4-FFF2-40B4-BE49-F238E27FC236}">
+                <a16:creationId xmlns:a16="http://schemas.microsoft.com/office/drawing/2014/main" id="{9C61CB9C-DF84-425E-928F-6B6ABABCEC50}"/>
+              </a:ext>
+              <a:ext uri="{C183D7F6-B498-43B3-948B-1728B52AA6E4}">
+                <adec:decorative xmlns:adec="http://schemas.microsoft.com/office/drawing/2017/decorative" val="1"/>
+              </a:ext>
+            </a:extLst>
+          </p:cNvPr>
+          <p:cNvSpPr>
+            <a:spLocks noGrp="1" noRot="1" noChangeAspect="1" noMove="1" noResize="1" noEditPoints="1" noAdjustHandles="1" noChangeArrowheads="1" noChangeShapeType="1" noTextEdit="1"/>
+          </p:cNvSpPr>
+          <p:nvPr>
+            <p:extLst>
+              <p:ext uri="{386F3935-93C4-4BCD-93E2-E3B085C9AB24}">
+                <p16:designElem xmlns:p16="http://schemas.microsoft.com/office/powerpoint/2015/main" val="1"/>
+              </p:ext>
+            </p:extLst>
+          </p:nvPr>
+        </p:nvSpPr>
+        <p:spPr>
+          <a:xfrm>
+            <a:off x="7554139" y="0"/>
+            <a:ext cx="4638280" cy="6858000"/>
+          </a:xfrm>
+          <a:prstGeom prst="rect">
+            <a:avLst/>
+          </a:prstGeom>
+          <a:solidFill>
+            <a:srgbClr val="FFFFFF"/>
+          </a:solidFill>
+          <a:ln>
+            <a:noFill/>
+          </a:ln>
+        </p:spPr>
+        <p:style>
+          <a:lnRef idx="2">
+            <a:schemeClr val="accent1">
+              <a:shade val="50000"/>
+            </a:schemeClr>
+          </a:lnRef>
+          <a:fillRef idx="1">
+            <a:schemeClr val="accent1"/>
+          </a:fillRef>
+          <a:effectRef idx="0">
+            <a:schemeClr val="accent1"/>
+          </a:effectRef>
+          <a:fontRef idx="minor">
+            <a:schemeClr val="lt1"/>
+          </a:fontRef>
+        </p:style>
+        <p:txBody>
+          <a:bodyPr rtlCol="0" anchor="ctr"/>
+          <a:lstStyle/>
+          <a:p>
+            <a:pPr algn="ctr"/>
+            <a:endParaRPr lang="en-US"/>
+          </a:p>
+        </p:txBody>
+      </p:sp>
+      <p:sp>
+        <p:nvSpPr>
+          <p:cNvPr id="77" name="Freeform 5">
+            <a:extLst>
+              <a:ext uri="{FF2B5EF4-FFF2-40B4-BE49-F238E27FC236}">
+                <a16:creationId xmlns:a16="http://schemas.microsoft.com/office/drawing/2014/main" id="{F7ECE4AC-C37F-40D5-9FE4-F07DE92F0A64}"/>
+              </a:ext>
+              <a:ext uri="{C183D7F6-B498-43B3-948B-1728B52AA6E4}">
+                <adec:decorative xmlns:adec="http://schemas.microsoft.com/office/drawing/2017/decorative" val="1"/>
+              </a:ext>
+            </a:extLst>
+          </p:cNvPr>
+          <p:cNvSpPr>
+            <a:spLocks noGrp="1" noRot="1" noChangeAspect="1" noMove="1" noResize="1" noEditPoints="1" noAdjustHandles="1" noChangeArrowheads="1" noChangeShapeType="1" noTextEdit="1"/>
+          </p:cNvSpPr>
+          <p:nvPr>
+            <p:extLst>
+              <p:ext uri="{386F3935-93C4-4BCD-93E2-E3B085C9AB24}">
+                <p16:designElem xmlns:p16="http://schemas.microsoft.com/office/powerpoint/2015/main" val="1"/>
+              </p:ext>
+            </p:extLst>
+          </p:nvPr>
+        </p:nvSpPr>
+        <p:spPr bwMode="gray">
+          <a:xfrm rot="16200000">
+            <a:off x="3906400" y="2756642"/>
+            <a:ext cx="6858000" cy="1344715"/>
+          </a:xfrm>
+          <a:custGeom>
+            <a:avLst/>
+            <a:gdLst/>
+            <a:ahLst/>
+            <a:cxnLst/>
+            <a:rect l="l" t="t" r="r" b="b"/>
+            <a:pathLst>
+              <a:path w="10000" h="8000">
+                <a:moveTo>
+                  <a:pt x="0" y="0"/>
+                </a:moveTo>
+                <a:lnTo>
+                  <a:pt x="0" y="7970"/>
+                </a:lnTo>
+                <a:lnTo>
+                  <a:pt x="10000" y="8000"/>
+                </a:lnTo>
+                <a:lnTo>
+                  <a:pt x="10000" y="7"/>
+                </a:lnTo>
+                <a:lnTo>
+                  <a:pt x="10000" y="7"/>
+                </a:lnTo>
+                <a:lnTo>
+                  <a:pt x="9773" y="156"/>
+                </a:lnTo>
+                <a:lnTo>
+                  <a:pt x="9547" y="298"/>
+                </a:lnTo>
+                <a:lnTo>
+                  <a:pt x="9320" y="437"/>
+                </a:lnTo>
+                <a:lnTo>
+                  <a:pt x="9092" y="556"/>
+                </a:lnTo>
+                <a:lnTo>
+                  <a:pt x="8865" y="676"/>
+                </a:lnTo>
+                <a:lnTo>
+                  <a:pt x="8637" y="788"/>
+                </a:lnTo>
+                <a:lnTo>
+                  <a:pt x="8412" y="884"/>
+                </a:lnTo>
+                <a:lnTo>
+                  <a:pt x="8184" y="975"/>
+                </a:lnTo>
+                <a:lnTo>
+                  <a:pt x="7957" y="1058"/>
+                </a:lnTo>
+                <a:lnTo>
+                  <a:pt x="7734" y="1130"/>
+                </a:lnTo>
+                <a:lnTo>
+                  <a:pt x="7508" y="1202"/>
+                </a:lnTo>
+                <a:lnTo>
+                  <a:pt x="7285" y="1262"/>
+                </a:lnTo>
+                <a:lnTo>
+                  <a:pt x="7062" y="1309"/>
+                </a:lnTo>
+                <a:lnTo>
+                  <a:pt x="6840" y="1358"/>
+                </a:lnTo>
+                <a:lnTo>
+                  <a:pt x="6620" y="1399"/>
+                </a:lnTo>
+                <a:lnTo>
+                  <a:pt x="6402" y="1428"/>
+                </a:lnTo>
+                <a:lnTo>
+                  <a:pt x="6184" y="1453"/>
+                </a:lnTo>
+                <a:lnTo>
+                  <a:pt x="5968" y="1477"/>
+                </a:lnTo>
+                <a:lnTo>
+                  <a:pt x="5755" y="1488"/>
+                </a:lnTo>
+                <a:lnTo>
+                  <a:pt x="5542" y="1500"/>
+                </a:lnTo>
+                <a:lnTo>
+                  <a:pt x="5332" y="1506"/>
+                </a:lnTo>
+                <a:lnTo>
+                  <a:pt x="5124" y="1500"/>
+                </a:lnTo>
+                <a:lnTo>
+                  <a:pt x="4918" y="1500"/>
+                </a:lnTo>
+                <a:lnTo>
+                  <a:pt x="4714" y="1488"/>
+                </a:lnTo>
+                <a:lnTo>
+                  <a:pt x="4514" y="1470"/>
+                </a:lnTo>
+                <a:lnTo>
+                  <a:pt x="4316" y="1453"/>
+                </a:lnTo>
+                <a:lnTo>
+                  <a:pt x="4122" y="1434"/>
+                </a:lnTo>
+                <a:lnTo>
+                  <a:pt x="3929" y="1405"/>
+                </a:lnTo>
+                <a:lnTo>
+                  <a:pt x="3739" y="1374"/>
+                </a:lnTo>
+                <a:lnTo>
+                  <a:pt x="3553" y="1346"/>
+                </a:lnTo>
+                <a:lnTo>
+                  <a:pt x="3190" y="1267"/>
+                </a:lnTo>
+                <a:lnTo>
+                  <a:pt x="2842" y="1183"/>
+                </a:lnTo>
+                <a:lnTo>
+                  <a:pt x="2508" y="1095"/>
+                </a:lnTo>
+                <a:lnTo>
+                  <a:pt x="2192" y="998"/>
+                </a:lnTo>
+                <a:lnTo>
+                  <a:pt x="1890" y="897"/>
+                </a:lnTo>
+                <a:lnTo>
+                  <a:pt x="1610" y="788"/>
+                </a:lnTo>
+                <a:lnTo>
+                  <a:pt x="1347" y="681"/>
+                </a:lnTo>
+                <a:lnTo>
+                  <a:pt x="1105" y="574"/>
+                </a:lnTo>
+                <a:lnTo>
+                  <a:pt x="883" y="473"/>
+                </a:lnTo>
+                <a:lnTo>
+                  <a:pt x="686" y="377"/>
+                </a:lnTo>
+                <a:lnTo>
+                  <a:pt x="508" y="286"/>
+                </a:lnTo>
+                <a:lnTo>
+                  <a:pt x="358" y="210"/>
+                </a:lnTo>
+                <a:lnTo>
+                  <a:pt x="232" y="138"/>
+                </a:lnTo>
+                <a:lnTo>
+                  <a:pt x="59" y="35"/>
+                </a:lnTo>
+                <a:lnTo>
+                  <a:pt x="0" y="0"/>
+                </a:lnTo>
+                <a:lnTo>
+                  <a:pt x="0" y="0"/>
+                </a:lnTo>
+                <a:close/>
+              </a:path>
+            </a:pathLst>
+          </a:custGeom>
+          <a:solidFill>
+            <a:srgbClr val="FFFFFF"/>
+          </a:solidFill>
+          <a:ln>
+            <a:noFill/>
+          </a:ln>
+        </p:spPr>
+      </p:sp>
+      <p:pic>
+        <p:nvPicPr>
+          <p:cNvPr id="6148" name="Picture 4" descr="Related image">
+            <a:extLst>
+              <a:ext uri="{FF2B5EF4-FFF2-40B4-BE49-F238E27FC236}">
+                <a16:creationId xmlns:a16="http://schemas.microsoft.com/office/drawing/2014/main" id="{E35E0086-52CC-4D0F-9C05-89D84E2B206C}"/>
+              </a:ext>
+            </a:extLst>
+          </p:cNvPr>
+          <p:cNvPicPr>
+            <a:picLocks noChangeAspect="1" noChangeArrowheads="1"/>
+          </p:cNvPicPr>
+          <p:nvPr/>
+        </p:nvPicPr>
+        <p:blipFill>
+          <a:blip r:embed="rId3">
+            <a:extLst>
+              <a:ext uri="{28A0092B-C50C-407E-A947-70E740481C1C}">
+                <a14:useLocalDpi xmlns:a14="http://schemas.microsoft.com/office/drawing/2010/main" val="0"/>
+              </a:ext>
+            </a:extLst>
+          </a:blip>
+          <a:srcRect/>
+          <a:stretch>
+            <a:fillRect/>
+          </a:stretch>
+        </p:blipFill>
+        <p:spPr bwMode="auto">
+          <a:xfrm>
+            <a:off x="7563742" y="715720"/>
+            <a:ext cx="3980139" cy="2547288"/>
+          </a:xfrm>
+          <a:prstGeom prst="rect">
+            <a:avLst/>
+          </a:prstGeom>
+          <a:noFill/>
+          <a:effectLst/>
+          <a:extLst>
+            <a:ext uri="{909E8E84-426E-40DD-AFC4-6F175D3DCCD1}">
+              <a14:hiddenFill xmlns:a14="http://schemas.microsoft.com/office/drawing/2010/main">
+                <a:solidFill>
+                  <a:srgbClr val="FFFFFF"/>
+                </a:solidFill>
+              </a14:hiddenFill>
+            </a:ext>
+          </a:extLst>
+        </p:spPr>
+      </p:pic>
+      <p:sp>
+        <p:nvSpPr>
+          <p:cNvPr id="79" name="Rectangle 78">
+            <a:extLst>
+              <a:ext uri="{FF2B5EF4-FFF2-40B4-BE49-F238E27FC236}">
+                <a16:creationId xmlns:a16="http://schemas.microsoft.com/office/drawing/2014/main" id="{7B983088-62B5-4A2F-8098-BBF2121047C5}"/>
+              </a:ext>
+              <a:ext uri="{C183D7F6-B498-43B3-948B-1728B52AA6E4}">
+                <adec:decorative xmlns:adec="http://schemas.microsoft.com/office/drawing/2017/decorative" val="1"/>
+              </a:ext>
+            </a:extLst>
+          </p:cNvPr>
+          <p:cNvSpPr>
+            <a:spLocks noGrp="1" noRot="1" noChangeAspect="1" noMove="1" noResize="1" noEditPoints="1" noAdjustHandles="1" noChangeArrowheads="1" noChangeShapeType="1" noTextEdit="1"/>
+          </p:cNvSpPr>
+          <p:nvPr>
+            <p:extLst>
+              <p:ext uri="{386F3935-93C4-4BCD-93E2-E3B085C9AB24}">
+                <p16:designElem xmlns:p16="http://schemas.microsoft.com/office/powerpoint/2015/main" val="1"/>
+              </p:ext>
+            </p:extLst>
+          </p:nvPr>
+        </p:nvSpPr>
+        <p:spPr>
+          <a:xfrm>
+            <a:off x="10442448" y="0"/>
+            <a:ext cx="685800" cy="1143000"/>
+          </a:xfrm>
+          <a:prstGeom prst="rect">
+            <a:avLst/>
+          </a:prstGeom>
+          <a:solidFill>
+            <a:schemeClr val="accent1"/>
+          </a:solidFill>
+          <a:ln>
+            <a:noFill/>
+          </a:ln>
+        </p:spPr>
+        <p:style>
+          <a:lnRef idx="1">
+            <a:schemeClr val="accent1"/>
+          </a:lnRef>
+          <a:fillRef idx="3">
+            <a:schemeClr val="accent1"/>
+          </a:fillRef>
+          <a:effectRef idx="2">
+            <a:schemeClr val="accent1"/>
+          </a:effectRef>
+          <a:fontRef idx="minor">
+            <a:schemeClr val="lt1"/>
+          </a:fontRef>
+        </p:style>
+      </p:sp>
+      <p:sp>
+        <p:nvSpPr>
+          <p:cNvPr id="3" name="Content Placeholder 2">
+            <a:extLst>
+              <a:ext uri="{FF2B5EF4-FFF2-40B4-BE49-F238E27FC236}">
+                <a16:creationId xmlns:a16="http://schemas.microsoft.com/office/drawing/2014/main" id="{B33ACE97-82EA-48F7-B19F-B3E46A2C08A8}"/>
+              </a:ext>
+            </a:extLst>
+          </p:cNvPr>
+          <p:cNvSpPr>
+            <a:spLocks noGrp="1"/>
+          </p:cNvSpPr>
+          <p:nvPr>
+            <p:ph idx="1"/>
+          </p:nvPr>
+        </p:nvSpPr>
+        <p:spPr>
+          <a:xfrm>
+            <a:off x="646112" y="2052918"/>
+            <a:ext cx="5628635" cy="4195481"/>
+          </a:xfrm>
+        </p:spPr>
+        <p:txBody>
+          <a:bodyPr>
+            <a:normAutofit/>
+          </a:bodyPr>
+          <a:lstStyle/>
+          <a:p>
+            <a:r>
+              <a:rPr lang="en-US" dirty="0" err="1"/>
+              <a:t>TensorFlow</a:t>
+            </a:r>
+            <a:r>
+              <a:rPr lang="en-US" dirty="0"/>
+              <a:t> is an open-source software library for dataflow programming across a range of tasks… very used in machine learning applications</a:t>
+            </a:r>
+          </a:p>
+          <a:p>
+            <a:r>
+              <a:rPr lang="en-US" dirty="0" err="1"/>
+              <a:t>Keras</a:t>
+            </a:r>
+            <a:r>
+              <a:rPr lang="en-US" dirty="0"/>
+              <a:t> is an open source neural network library written in Python. It runs on top of </a:t>
+            </a:r>
+            <a:r>
+              <a:rPr lang="en-US" dirty="0" err="1"/>
+              <a:t>TensorFlow</a:t>
+            </a:r>
+            <a:endParaRPr lang="en-US" dirty="0"/>
+          </a:p>
+        </p:txBody>
+      </p:sp>
+      <p:pic>
+        <p:nvPicPr>
+          <p:cNvPr id="6146" name="Picture 2" descr="Image result for keras machine learning">
+            <a:extLst>
+              <a:ext uri="{FF2B5EF4-FFF2-40B4-BE49-F238E27FC236}">
+                <a16:creationId xmlns:a16="http://schemas.microsoft.com/office/drawing/2014/main" id="{0C6AEC16-F87A-4600-A998-BA0915F6D6F1}"/>
+              </a:ext>
+            </a:extLst>
+          </p:cNvPr>
+          <p:cNvPicPr>
+            <a:picLocks noChangeAspect="1" noChangeArrowheads="1"/>
+          </p:cNvPicPr>
+          <p:nvPr/>
+        </p:nvPicPr>
+        <p:blipFill>
+          <a:blip r:embed="rId4">
+            <a:extLst>
+              <a:ext uri="{28A0092B-C50C-407E-A947-70E740481C1C}">
+                <a14:useLocalDpi xmlns:a14="http://schemas.microsoft.com/office/drawing/2010/main" val="0"/>
+              </a:ext>
+            </a:extLst>
+          </a:blip>
+          <a:srcRect/>
+          <a:stretch>
+            <a:fillRect/>
+          </a:stretch>
+        </p:blipFill>
+        <p:spPr bwMode="auto">
+          <a:xfrm>
+            <a:off x="8193098" y="3526971"/>
+            <a:ext cx="2721427" cy="2721427"/>
+          </a:xfrm>
+          <a:prstGeom prst="rect">
+            <a:avLst/>
+          </a:prstGeom>
+          <a:noFill/>
+          <a:effectLst/>
+          <a:extLst>
+            <a:ext uri="{909E8E84-426E-40DD-AFC4-6F175D3DCCD1}">
+              <a14:hiddenFill xmlns:a14="http://schemas.microsoft.com/office/drawing/2010/main">
+                <a:solidFill>
+                  <a:srgbClr val="FFFFFF"/>
+                </a:solidFill>
+              </a14:hiddenFill>
+            </a:ext>
+          </a:extLst>
+        </p:spPr>
+      </p:pic>
+    </p:spTree>
+    <p:extLst>
+      <p:ext uri="{BB962C8B-B14F-4D97-AF65-F5344CB8AC3E}">
+        <p14:creationId xmlns:p14="http://schemas.microsoft.com/office/powerpoint/2010/main" val="2042469434"/>
+      </p:ext>
+    </p:extLst>
+  </p:cSld>
+  <p:clrMapOvr>
+    <a:masterClrMapping/>
+  </p:clrMapOvr>
+</p:sld>
+</file>
+
+<file path=ppt/slides/slide13.xml><?xml version="1.0" encoding="utf-8"?>
+<p:sld xmlns:a="http://schemas.openxmlformats.org/drawingml/2006/main" xmlns:r="http://schemas.openxmlformats.org/officeDocument/2006/relationships" xmlns:p="http://schemas.openxmlformats.org/presentationml/2006/main">
+  <p:cSld>
+    <p:spTree>
+      <p:nvGrpSpPr>
+        <p:cNvPr id="1" name=""/>
+        <p:cNvGrpSpPr/>
+        <p:nvPr/>
+      </p:nvGrpSpPr>
+      <p:grpSpPr>
+        <a:xfrm>
+          <a:off x="0" y="0"/>
+          <a:ext cx="0" cy="0"/>
+          <a:chOff x="0" y="0"/>
+          <a:chExt cx="0" cy="0"/>
+        </a:xfrm>
+      </p:grpSpPr>
+      <p:sp>
+        <p:nvSpPr>
+          <p:cNvPr id="2" name="Title 1">
+            <a:extLst>
+              <a:ext uri="{FF2B5EF4-FFF2-40B4-BE49-F238E27FC236}">
+                <a16:creationId xmlns:a16="http://schemas.microsoft.com/office/drawing/2014/main" id="{EDA23C2B-8911-442D-92B9-6BE80718B0A8}"/>
+              </a:ext>
+            </a:extLst>
+          </p:cNvPr>
+          <p:cNvSpPr>
+            <a:spLocks noGrp="1"/>
+          </p:cNvSpPr>
+          <p:nvPr>
+            <p:ph type="title"/>
+          </p:nvPr>
+        </p:nvSpPr>
+        <p:spPr>
+          <a:xfrm>
+            <a:off x="646111" y="452718"/>
+            <a:ext cx="9404723" cy="1400530"/>
+          </a:xfrm>
+        </p:spPr>
+        <p:txBody>
+          <a:bodyPr/>
+          <a:lstStyle/>
+          <a:p>
+            <a:r>
+              <a:rPr lang="en-US" dirty="0"/>
+              <a:t>The Simpsons CNN!</a:t>
+            </a:r>
+          </a:p>
+        </p:txBody>
+      </p:sp>
+      <p:pic>
+        <p:nvPicPr>
+          <p:cNvPr id="7172" name="Picture 4" descr="Image result for the simpsons">
+            <a:extLst>
+              <a:ext uri="{FF2B5EF4-FFF2-40B4-BE49-F238E27FC236}">
+                <a16:creationId xmlns:a16="http://schemas.microsoft.com/office/drawing/2014/main" id="{0BF1BC16-A8C1-41FA-A920-EAA352566F9B}"/>
+              </a:ext>
+            </a:extLst>
+          </p:cNvPr>
+          <p:cNvPicPr>
+            <a:picLocks noChangeAspect="1" noChangeArrowheads="1"/>
+          </p:cNvPicPr>
+          <p:nvPr/>
+        </p:nvPicPr>
+        <p:blipFill>
+          <a:blip r:embed="rId2">
+            <a:extLst>
+              <a:ext uri="{28A0092B-C50C-407E-A947-70E740481C1C}">
+                <a14:useLocalDpi xmlns:a14="http://schemas.microsoft.com/office/drawing/2010/main" val="0"/>
+              </a:ext>
+            </a:extLst>
+          </a:blip>
+          <a:srcRect/>
+          <a:stretch>
+            <a:fillRect/>
+          </a:stretch>
+        </p:blipFill>
+        <p:spPr bwMode="auto">
+          <a:xfrm>
+            <a:off x="1778925" y="2078177"/>
+            <a:ext cx="8489393" cy="3697922"/>
+          </a:xfrm>
+          <a:prstGeom prst="rect">
+            <a:avLst/>
+          </a:prstGeom>
+          <a:noFill/>
+          <a:extLst>
+            <a:ext uri="{909E8E84-426E-40DD-AFC4-6F175D3DCCD1}">
+              <a14:hiddenFill xmlns:a14="http://schemas.microsoft.com/office/drawing/2010/main">
+                <a:solidFill>
+                  <a:srgbClr val="FFFFFF"/>
+                </a:solidFill>
+              </a14:hiddenFill>
+            </a:ext>
+          </a:extLst>
+        </p:spPr>
+      </p:pic>
+    </p:spTree>
+    <p:extLst>
+      <p:ext uri="{BB962C8B-B14F-4D97-AF65-F5344CB8AC3E}">
+        <p14:creationId xmlns:p14="http://schemas.microsoft.com/office/powerpoint/2010/main" val="74226621"/>
+      </p:ext>
+    </p:extLst>
+  </p:cSld>
+  <p:clrMapOvr>
+    <a:masterClrMapping/>
+  </p:clrMapOvr>
+</p:sld>
+</file>
+
+<file path=ppt/slides/slide14.xml><?xml version="1.0" encoding="utf-8"?>
+<p:sld xmlns:a="http://schemas.openxmlformats.org/drawingml/2006/main" xmlns:r="http://schemas.openxmlformats.org/officeDocument/2006/relationships" xmlns:p="http://schemas.openxmlformats.org/presentationml/2006/main">
+  <p:cSld>
+    <p:spTree>
+      <p:nvGrpSpPr>
+        <p:cNvPr id="1" name=""/>
+        <p:cNvGrpSpPr/>
+        <p:nvPr/>
+      </p:nvGrpSpPr>
+      <p:grpSpPr>
+        <a:xfrm>
+          <a:off x="0" y="0"/>
+          <a:ext cx="0" cy="0"/>
+          <a:chOff x="0" y="0"/>
+          <a:chExt cx="0" cy="0"/>
+        </a:xfrm>
+      </p:grpSpPr>
+      <p:sp>
+        <p:nvSpPr>
+          <p:cNvPr id="2" name="Title 1">
+            <a:extLst>
+              <a:ext uri="{FF2B5EF4-FFF2-40B4-BE49-F238E27FC236}">
                 <a16:creationId xmlns:a16="http://schemas.microsoft.com/office/drawing/2014/main" id="{68B7DB11-7239-444B-82A4-A6DA6A3E2622}"/>
               </a:ext>
             </a:extLst>
@@ -9732,6 +11043,200 @@
 <file path=ppt/slides/slide3.xml><?xml version="1.0" encoding="utf-8"?>
 <p:sld xmlns:a="http://schemas.openxmlformats.org/drawingml/2006/main" xmlns:r="http://schemas.openxmlformats.org/officeDocument/2006/relationships" xmlns:p="http://schemas.openxmlformats.org/presentationml/2006/main">
   <p:cSld>
+    <p:spTree>
+      <p:nvGrpSpPr>
+        <p:cNvPr id="1" name=""/>
+        <p:cNvGrpSpPr/>
+        <p:nvPr/>
+      </p:nvGrpSpPr>
+      <p:grpSpPr>
+        <a:xfrm>
+          <a:off x="0" y="0"/>
+          <a:ext cx="0" cy="0"/>
+          <a:chOff x="0" y="0"/>
+          <a:chExt cx="0" cy="0"/>
+        </a:xfrm>
+      </p:grpSpPr>
+      <p:sp>
+        <p:nvSpPr>
+          <p:cNvPr id="2" name="Title 1">
+            <a:extLst>
+              <a:ext uri="{FF2B5EF4-FFF2-40B4-BE49-F238E27FC236}">
+                <a16:creationId xmlns:a16="http://schemas.microsoft.com/office/drawing/2014/main" id="{77B065B1-E33C-4603-9595-9B1FE05E1E3C}"/>
+              </a:ext>
+            </a:extLst>
+          </p:cNvPr>
+          <p:cNvSpPr>
+            <a:spLocks noGrp="1"/>
+          </p:cNvSpPr>
+          <p:nvPr>
+            <p:ph type="title"/>
+          </p:nvPr>
+        </p:nvSpPr>
+        <p:spPr/>
+        <p:txBody>
+          <a:bodyPr/>
+          <a:lstStyle/>
+          <a:p>
+            <a:r>
+              <a:rPr lang="en-US" dirty="0"/>
+              <a:t>Why are they useful?</a:t>
+            </a:r>
+          </a:p>
+        </p:txBody>
+      </p:sp>
+      <p:sp>
+        <p:nvSpPr>
+          <p:cNvPr id="3" name="Content Placeholder 2">
+            <a:extLst>
+              <a:ext uri="{FF2B5EF4-FFF2-40B4-BE49-F238E27FC236}">
+                <a16:creationId xmlns:a16="http://schemas.microsoft.com/office/drawing/2014/main" id="{8554AB8E-5924-4116-B95D-B9656A7170BE}"/>
+              </a:ext>
+            </a:extLst>
+          </p:cNvPr>
+          <p:cNvSpPr>
+            <a:spLocks noGrp="1"/>
+          </p:cNvSpPr>
+          <p:nvPr>
+            <p:ph idx="1"/>
+          </p:nvPr>
+        </p:nvSpPr>
+        <p:spPr>
+          <a:xfrm>
+            <a:off x="1103312" y="2052918"/>
+            <a:ext cx="8946541" cy="4195481"/>
+          </a:xfrm>
+        </p:spPr>
+        <p:txBody>
+          <a:bodyPr/>
+          <a:lstStyle/>
+          <a:p>
+            <a:r>
+              <a:rPr lang="en-US" dirty="0"/>
+              <a:t>Allows us to reduce the dimensionality of in image by only extracting the important features.</a:t>
+            </a:r>
+          </a:p>
+          <a:p>
+            <a:endParaRPr lang="en-US" dirty="0"/>
+          </a:p>
+          <a:p>
+            <a:r>
+              <a:rPr lang="en-US" dirty="0"/>
+              <a:t>By only extracting the important features on image, it allows us to recognize images that are not the same</a:t>
+            </a:r>
+          </a:p>
+        </p:txBody>
+      </p:sp>
+      <p:pic>
+        <p:nvPicPr>
+          <p:cNvPr id="3074" name="Picture 2" descr="Image result for tiger animal">
+            <a:extLst>
+              <a:ext uri="{FF2B5EF4-FFF2-40B4-BE49-F238E27FC236}">
+                <a16:creationId xmlns:a16="http://schemas.microsoft.com/office/drawing/2014/main" id="{527266C3-18BC-4D2A-BA5A-FE4635E6BF5D}"/>
+              </a:ext>
+            </a:extLst>
+          </p:cNvPr>
+          <p:cNvPicPr>
+            <a:picLocks noChangeAspect="1" noChangeArrowheads="1"/>
+          </p:cNvPicPr>
+          <p:nvPr/>
+        </p:nvPicPr>
+        <p:blipFill>
+          <a:blip r:embed="rId2">
+            <a:extLst>
+              <a:ext uri="{28A0092B-C50C-407E-A947-70E740481C1C}">
+                <a14:useLocalDpi xmlns:a14="http://schemas.microsoft.com/office/drawing/2010/main" val="0"/>
+              </a:ext>
+            </a:extLst>
+          </a:blip>
+          <a:srcRect/>
+          <a:stretch>
+            <a:fillRect/>
+          </a:stretch>
+        </p:blipFill>
+        <p:spPr bwMode="auto">
+          <a:xfrm>
+            <a:off x="1545753" y="4150658"/>
+            <a:ext cx="3732148" cy="2341507"/>
+          </a:xfrm>
+          <a:prstGeom prst="rect">
+            <a:avLst/>
+          </a:prstGeom>
+          <a:noFill/>
+          <a:extLst>
+            <a:ext uri="{909E8E84-426E-40DD-AFC4-6F175D3DCCD1}">
+              <a14:hiddenFill xmlns:a14="http://schemas.microsoft.com/office/drawing/2010/main">
+                <a:solidFill>
+                  <a:srgbClr val="FFFFFF"/>
+                </a:solidFill>
+              </a14:hiddenFill>
+            </a:ext>
+          </a:extLst>
+        </p:spPr>
+      </p:pic>
+      <p:pic>
+        <p:nvPicPr>
+          <p:cNvPr id="3076" name="Picture 4" descr="Image result for tiger animal">
+            <a:extLst>
+              <a:ext uri="{FF2B5EF4-FFF2-40B4-BE49-F238E27FC236}">
+                <a16:creationId xmlns:a16="http://schemas.microsoft.com/office/drawing/2014/main" id="{D7700873-C4D3-4A94-B933-8142338D8E03}"/>
+              </a:ext>
+            </a:extLst>
+          </p:cNvPr>
+          <p:cNvPicPr>
+            <a:picLocks noChangeAspect="1" noChangeArrowheads="1"/>
+          </p:cNvPicPr>
+          <p:nvPr/>
+        </p:nvPicPr>
+        <p:blipFill>
+          <a:blip r:embed="rId3">
+            <a:extLst>
+              <a:ext uri="{28A0092B-C50C-407E-A947-70E740481C1C}">
+                <a14:useLocalDpi xmlns:a14="http://schemas.microsoft.com/office/drawing/2010/main" val="0"/>
+              </a:ext>
+            </a:extLst>
+          </a:blip>
+          <a:srcRect/>
+          <a:stretch>
+            <a:fillRect/>
+          </a:stretch>
+        </p:blipFill>
+        <p:spPr bwMode="auto">
+          <a:xfrm>
+            <a:off x="6096000" y="4150658"/>
+            <a:ext cx="3732148" cy="2341507"/>
+          </a:xfrm>
+          <a:prstGeom prst="rect">
+            <a:avLst/>
+          </a:prstGeom>
+          <a:noFill/>
+          <a:extLst>
+            <a:ext uri="{909E8E84-426E-40DD-AFC4-6F175D3DCCD1}">
+              <a14:hiddenFill xmlns:a14="http://schemas.microsoft.com/office/drawing/2010/main">
+                <a:solidFill>
+                  <a:srgbClr val="FFFFFF"/>
+                </a:solidFill>
+              </a14:hiddenFill>
+            </a:ext>
+          </a:extLst>
+        </p:spPr>
+      </p:pic>
+    </p:spTree>
+    <p:extLst>
+      <p:ext uri="{BB962C8B-B14F-4D97-AF65-F5344CB8AC3E}">
+        <p14:creationId xmlns:p14="http://schemas.microsoft.com/office/powerpoint/2010/main" val="1277017108"/>
+      </p:ext>
+    </p:extLst>
+  </p:cSld>
+  <p:clrMapOvr>
+    <a:masterClrMapping/>
+  </p:clrMapOvr>
+</p:sld>
+</file>
+
+<file path=ppt/slides/slide4.xml><?xml version="1.0" encoding="utf-8"?>
+<p:sld xmlns:a="http://schemas.openxmlformats.org/drawingml/2006/main" xmlns:r="http://schemas.openxmlformats.org/officeDocument/2006/relationships" xmlns:p="http://schemas.openxmlformats.org/presentationml/2006/main">
+  <p:cSld>
     <p:bg>
       <p:bgPr>
         <a:blipFill rotWithShape="1">
@@ -9892,7 +11397,7 @@
                 <a16:creationId xmlns:a16="http://schemas.microsoft.com/office/drawing/2014/main" id="{1F7E4252-2F8C-4EA5-8B25-80F4D86EEA87}"/>
               </a:ext>
               <a:ext uri="{C183D7F6-B498-43B3-948B-1728B52AA6E4}">
-                <adec:decorative xmlns:adec="http://schemas.microsoft.com/office/drawing/2017/decorative" xmlns="" val="1"/>
+                <adec:decorative xmlns:adec="http://schemas.microsoft.com/office/drawing/2017/decorative" val="1"/>
               </a:ext>
             </a:extLst>
           </p:cNvPr>
@@ -10244,7 +11749,7 @@
                 <a16:creationId xmlns:a16="http://schemas.microsoft.com/office/drawing/2014/main" id="{1AE682A4-5C0C-437A-88CB-93903D449D39}"/>
               </a:ext>
               <a:ext uri="{C183D7F6-B498-43B3-948B-1728B52AA6E4}">
-                <adec:decorative xmlns:adec="http://schemas.microsoft.com/office/drawing/2017/decorative" xmlns="" val="1"/>
+                <adec:decorative xmlns:adec="http://schemas.microsoft.com/office/drawing/2017/decorative" val="1"/>
               </a:ext>
             </a:extLst>
           </p:cNvPr>
@@ -10307,7 +11812,7 @@
                 <a16:creationId xmlns:a16="http://schemas.microsoft.com/office/drawing/2014/main" id="{BCB0AB8E-3445-441A-B43E-CED27841E742}"/>
               </a:ext>
               <a:ext uri="{C183D7F6-B498-43B3-948B-1728B52AA6E4}">
-                <adec:decorative xmlns:adec="http://schemas.microsoft.com/office/drawing/2017/decorative" xmlns="" val="1"/>
+                <adec:decorative xmlns:adec="http://schemas.microsoft.com/office/drawing/2017/decorative" val="1"/>
               </a:ext>
             </a:extLst>
           </p:cNvPr>
@@ -10539,7 +12044,7 @@
                 <a16:creationId xmlns:a16="http://schemas.microsoft.com/office/drawing/2014/main" id="{60202AA6-BAFE-417F-904D-4F7027D36D8B}"/>
               </a:ext>
               <a:ext uri="{C183D7F6-B498-43B3-948B-1728B52AA6E4}">
-                <adec:decorative xmlns:adec="http://schemas.microsoft.com/office/drawing/2017/decorative" xmlns="" val="1"/>
+                <adec:decorative xmlns:adec="http://schemas.microsoft.com/office/drawing/2017/decorative" val="1"/>
               </a:ext>
             </a:extLst>
           </p:cNvPr>
@@ -10597,7 +12102,7 @@
 </p:sld>
 </file>
 
-<file path=ppt/slides/slide4.xml><?xml version="1.0" encoding="utf-8"?>
+<file path=ppt/slides/slide5.xml><?xml version="1.0" encoding="utf-8"?>
 <p:sld xmlns:a="http://schemas.openxmlformats.org/drawingml/2006/main" xmlns:r="http://schemas.openxmlformats.org/officeDocument/2006/relationships" xmlns:p="http://schemas.openxmlformats.org/presentationml/2006/main">
   <p:cSld>
     <p:bg>
@@ -10647,7 +12152,7 @@
                 <a16:creationId xmlns:a16="http://schemas.microsoft.com/office/drawing/2014/main" id="{0A01F2A2-AEDD-47DC-AFB5-B97CEB9A5328}"/>
               </a:ext>
               <a:ext uri="{C183D7F6-B498-43B3-948B-1728B52AA6E4}">
-                <adec:decorative xmlns:adec="http://schemas.microsoft.com/office/drawing/2017/decorative" xmlns="" val="1"/>
+                <adec:decorative xmlns:adec="http://schemas.microsoft.com/office/drawing/2017/decorative" val="1"/>
               </a:ext>
             </a:extLst>
           </p:cNvPr>
@@ -11046,7 +12551,7 @@
                 <a16:creationId xmlns:a16="http://schemas.microsoft.com/office/drawing/2014/main" id="{DB5AF5F3-AD0A-4EFA-854A-47C780F26264}"/>
               </a:ext>
               <a:ext uri="{C183D7F6-B498-43B3-948B-1728B52AA6E4}">
-                <adec:decorative xmlns:adec="http://schemas.microsoft.com/office/drawing/2017/decorative" xmlns="" val="1"/>
+                <adec:decorative xmlns:adec="http://schemas.microsoft.com/office/drawing/2017/decorative" val="1"/>
               </a:ext>
             </a:extLst>
           </p:cNvPr>
@@ -11109,7 +12614,7 @@
                 <a16:creationId xmlns:a16="http://schemas.microsoft.com/office/drawing/2014/main" id="{1E3D6D6C-E192-4135-B1DB-17C71EEBC946}"/>
               </a:ext>
               <a:ext uri="{C183D7F6-B498-43B3-948B-1728B52AA6E4}">
-                <adec:decorative xmlns:adec="http://schemas.microsoft.com/office/drawing/2017/decorative" xmlns="" val="1"/>
+                <adec:decorative xmlns:adec="http://schemas.microsoft.com/office/drawing/2017/decorative" val="1"/>
               </a:ext>
             </a:extLst>
           </p:cNvPr>
@@ -11378,10 +12883,10 @@
       </p:sp>
       <p:pic>
         <p:nvPicPr>
-          <p:cNvPr id="2050" name="Picture 2" descr="https://cdn-images-1.medium.com/max/1000/1*ZCjPUFrB6eHPRi4eyP6aaA.gif">
+          <p:cNvPr id="4" name="Picture 2" descr="https://www.saama.com/wp-content/uploads/2017/12/convolution_schematic.gif">
             <a:extLst>
               <a:ext uri="{FF2B5EF4-FFF2-40B4-BE49-F238E27FC236}">
-                <a16:creationId xmlns:a16="http://schemas.microsoft.com/office/drawing/2014/main" id="{DA23EC51-A7F4-410B-A616-47FE6807C213}"/>
+                <a16:creationId xmlns:a16="http://schemas.microsoft.com/office/drawing/2014/main" id="{E3DBFA64-BFAB-46D6-AC83-3DFF29933AC1}"/>
               </a:ext>
             </a:extLst>
           </p:cNvPr>
@@ -11405,14 +12910,13 @@
         </p:blipFill>
         <p:spPr bwMode="auto">
           <a:xfrm>
-            <a:off x="6309629" y="2548281"/>
-            <a:ext cx="5016201" cy="3662018"/>
+            <a:off x="6095848" y="2548281"/>
+            <a:ext cx="5010150" cy="3657600"/>
           </a:xfrm>
           <a:prstGeom prst="rect">
             <a:avLst/>
           </a:prstGeom>
           <a:noFill/>
-          <a:effectLst/>
           <a:extLst>
             <a:ext uri="{909E8E84-426E-40DD-AFC4-6F175D3DCCD1}">
               <a14:hiddenFill xmlns:a14="http://schemas.microsoft.com/office/drawing/2010/main">
@@ -11428,380 +12932,6 @@
     <p:extLst>
       <p:ext uri="{BB962C8B-B14F-4D97-AF65-F5344CB8AC3E}">
         <p14:creationId xmlns:p14="http://schemas.microsoft.com/office/powerpoint/2010/main" val="3193626379"/>
-      </p:ext>
-    </p:extLst>
-  </p:cSld>
-  <p:clrMapOvr>
-    <a:masterClrMapping/>
-  </p:clrMapOvr>
-</p:sld>
-</file>
-
-<file path=ppt/slides/slide5.xml><?xml version="1.0" encoding="utf-8"?>
-<p:sld xmlns:a="http://schemas.openxmlformats.org/drawingml/2006/main" xmlns:r="http://schemas.openxmlformats.org/officeDocument/2006/relationships" xmlns:p="http://schemas.openxmlformats.org/presentationml/2006/main">
-  <p:cSld>
-    <p:bg>
-      <p:bgPr>
-        <a:blipFill rotWithShape="1">
-          <a:blip r:embed="rId2">
-            <a:duotone>
-              <a:schemeClr val="bg2">
-                <a:shade val="62000"/>
-                <a:hueMod val="108000"/>
-                <a:satMod val="164000"/>
-                <a:lumMod val="69000"/>
-              </a:schemeClr>
-              <a:schemeClr val="bg2">
-                <a:tint val="96000"/>
-                <a:hueMod val="90000"/>
-                <a:satMod val="130000"/>
-                <a:lumMod val="134000"/>
-              </a:schemeClr>
-            </a:duotone>
-            <a:extLst/>
-          </a:blip>
-          <a:stretch/>
-        </a:blipFill>
-        <a:effectLst/>
-      </p:bgPr>
-    </p:bg>
-    <p:spTree>
-      <p:nvGrpSpPr>
-        <p:cNvPr id="1" name=""/>
-        <p:cNvGrpSpPr/>
-        <p:nvPr/>
-      </p:nvGrpSpPr>
-      <p:grpSpPr>
-        <a:xfrm>
-          <a:off x="0" y="0"/>
-          <a:ext cx="0" cy="0"/>
-          <a:chOff x="0" y="0"/>
-          <a:chExt cx="0" cy="0"/>
-        </a:xfrm>
-      </p:grpSpPr>
-      <p:sp>
-        <p:nvSpPr>
-          <p:cNvPr id="2" name="Title 1">
-            <a:extLst>
-              <a:ext uri="{FF2B5EF4-FFF2-40B4-BE49-F238E27FC236}">
-                <a16:creationId xmlns:a16="http://schemas.microsoft.com/office/drawing/2014/main" id="{40477105-562F-4C08-8B00-FE30C74F9C48}"/>
-              </a:ext>
-            </a:extLst>
-          </p:cNvPr>
-          <p:cNvSpPr>
-            <a:spLocks noGrp="1"/>
-          </p:cNvSpPr>
-          <p:nvPr>
-            <p:ph type="title"/>
-          </p:nvPr>
-        </p:nvSpPr>
-        <p:spPr>
-          <a:xfrm>
-            <a:off x="648929" y="629266"/>
-            <a:ext cx="4944152" cy="1622321"/>
-          </a:xfrm>
-        </p:spPr>
-        <p:txBody>
-          <a:bodyPr>
-            <a:normAutofit/>
-          </a:bodyPr>
-          <a:lstStyle/>
-          <a:p>
-            <a:r>
-              <a:rPr lang="en-US" dirty="0"/>
-              <a:t>Some terms</a:t>
-            </a:r>
-          </a:p>
-        </p:txBody>
-      </p:sp>
-      <p:sp>
-        <p:nvSpPr>
-          <p:cNvPr id="3" name="Content Placeholder 2">
-            <a:extLst>
-              <a:ext uri="{FF2B5EF4-FFF2-40B4-BE49-F238E27FC236}">
-                <a16:creationId xmlns:a16="http://schemas.microsoft.com/office/drawing/2014/main" id="{0E242E71-7630-4A8D-864E-FAE156FD99E8}"/>
-              </a:ext>
-            </a:extLst>
-          </p:cNvPr>
-          <p:cNvSpPr>
-            <a:spLocks noGrp="1"/>
-          </p:cNvSpPr>
-          <p:nvPr>
-            <p:ph idx="1"/>
-          </p:nvPr>
-        </p:nvSpPr>
-        <p:spPr>
-          <a:xfrm>
-            <a:off x="648930" y="2438400"/>
-            <a:ext cx="4944151" cy="3785419"/>
-          </a:xfrm>
-        </p:spPr>
-        <p:txBody>
-          <a:bodyPr>
-            <a:normAutofit/>
-          </a:bodyPr>
-          <a:lstStyle/>
-          <a:p>
-            <a:r>
-              <a:rPr lang="en-US" dirty="0"/>
-              <a:t>Stride is the size of the step. A larger stride leads to fewer steps, which means a smaller activation map. (less time to compute!!)</a:t>
-            </a:r>
-          </a:p>
-          <a:p>
-            <a:endParaRPr lang="en-US" dirty="0"/>
-          </a:p>
-          <a:p>
-            <a:r>
-              <a:rPr lang="en-US" dirty="0"/>
-              <a:t>Padding is adding 0’s around the layers. This allows us to preserve as much information about the original input volume</a:t>
-            </a:r>
-          </a:p>
-        </p:txBody>
-      </p:sp>
-      <p:sp>
-        <p:nvSpPr>
-          <p:cNvPr id="10" name="Rectangle 9">
-            <a:extLst>
-              <a:ext uri="{FF2B5EF4-FFF2-40B4-BE49-F238E27FC236}">
-                <a16:creationId xmlns:a16="http://schemas.microsoft.com/office/drawing/2014/main" id="{B1C2DFB7-5186-4D49-B5A6-99BDF443A48D}"/>
-              </a:ext>
-              <a:ext uri="{C183D7F6-B498-43B3-948B-1728B52AA6E4}">
-                <adec:decorative xmlns:adec="http://schemas.microsoft.com/office/drawing/2017/decorative" xmlns="" val="1"/>
-              </a:ext>
-            </a:extLst>
-          </p:cNvPr>
-          <p:cNvSpPr>
-            <a:spLocks noGrp="1" noRot="1" noChangeAspect="1" noMove="1" noResize="1" noEditPoints="1" noAdjustHandles="1" noChangeArrowheads="1" noChangeShapeType="1" noTextEdit="1"/>
-          </p:cNvSpPr>
-          <p:nvPr>
-            <p:extLst>
-              <p:ext uri="{386F3935-93C4-4BCD-93E2-E3B085C9AB24}">
-                <p16:designElem xmlns:p16="http://schemas.microsoft.com/office/powerpoint/2015/main" val="1"/>
-              </p:ext>
-            </p:extLst>
-          </p:nvPr>
-        </p:nvSpPr>
-        <p:spPr>
-          <a:xfrm>
-            <a:off x="6092950" y="0"/>
-            <a:ext cx="6099050" cy="6858000"/>
-          </a:xfrm>
-          <a:prstGeom prst="rect">
-            <a:avLst/>
-          </a:prstGeom>
-          <a:solidFill>
-            <a:srgbClr val="FFFFFF"/>
-          </a:solidFill>
-          <a:ln>
-            <a:noFill/>
-          </a:ln>
-        </p:spPr>
-        <p:style>
-          <a:lnRef idx="2">
-            <a:schemeClr val="accent1">
-              <a:shade val="50000"/>
-            </a:schemeClr>
-          </a:lnRef>
-          <a:fillRef idx="1">
-            <a:schemeClr val="accent1"/>
-          </a:fillRef>
-          <a:effectRef idx="0">
-            <a:schemeClr val="accent1"/>
-          </a:effectRef>
-          <a:fontRef idx="minor">
-            <a:schemeClr val="lt1"/>
-          </a:fontRef>
-        </p:style>
-        <p:txBody>
-          <a:bodyPr rtlCol="0" anchor="ctr"/>
-          <a:lstStyle/>
-          <a:p>
-            <a:pPr algn="ctr"/>
-            <a:endParaRPr lang="en-US"/>
-          </a:p>
-        </p:txBody>
-      </p:sp>
-      <p:sp>
-        <p:nvSpPr>
-          <p:cNvPr id="12" name="Rounded Rectangle 9">
-            <a:extLst>
-              <a:ext uri="{FF2B5EF4-FFF2-40B4-BE49-F238E27FC236}">
-                <a16:creationId xmlns:a16="http://schemas.microsoft.com/office/drawing/2014/main" id="{8E46F046-D267-4952-A9CF-D2E73187A6A4}"/>
-              </a:ext>
-              <a:ext uri="{C183D7F6-B498-43B3-948B-1728B52AA6E4}">
-                <adec:decorative xmlns:adec="http://schemas.microsoft.com/office/drawing/2017/decorative" xmlns="" val="1"/>
-              </a:ext>
-            </a:extLst>
-          </p:cNvPr>
-          <p:cNvSpPr>
-            <a:spLocks noGrp="1" noRot="1" noChangeAspect="1" noMove="1" noResize="1" noEditPoints="1" noAdjustHandles="1" noChangeArrowheads="1" noChangeShapeType="1" noTextEdit="1"/>
-          </p:cNvSpPr>
-          <p:nvPr>
-            <p:extLst>
-              <p:ext uri="{386F3935-93C4-4BCD-93E2-E3B085C9AB24}">
-                <p16:designElem xmlns:p16="http://schemas.microsoft.com/office/powerpoint/2015/main" val="1"/>
-              </p:ext>
-            </p:extLst>
-          </p:nvPr>
-        </p:nvSpPr>
-        <p:spPr>
-          <a:xfrm>
-            <a:off x="6577582" y="484632"/>
-            <a:ext cx="5130204" cy="5739187"/>
-          </a:xfrm>
-          <a:prstGeom prst="roundRect">
-            <a:avLst>
-              <a:gd name="adj" fmla="val 0"/>
-            </a:avLst>
-          </a:prstGeom>
-          <a:solidFill>
-            <a:schemeClr val="tx1"/>
-          </a:solidFill>
-          <a:ln w="12700">
-            <a:solidFill>
-              <a:schemeClr val="tx2">
-                <a:lumMod val="75000"/>
-              </a:schemeClr>
-            </a:solidFill>
-          </a:ln>
-          <a:effectLst>
-            <a:outerShdw blurRad="50800" dist="50800" dir="5400000" algn="tl" rotWithShape="0">
-              <a:srgbClr val="000000">
-                <a:alpha val="43000"/>
-              </a:srgbClr>
-            </a:outerShdw>
-          </a:effectLst>
-        </p:spPr>
-        <p:style>
-          <a:lnRef idx="2">
-            <a:schemeClr val="accent1">
-              <a:shade val="50000"/>
-            </a:schemeClr>
-          </a:lnRef>
-          <a:fillRef idx="1">
-            <a:schemeClr val="accent1"/>
-          </a:fillRef>
-          <a:effectRef idx="0">
-            <a:schemeClr val="accent1"/>
-          </a:effectRef>
-          <a:fontRef idx="minor">
-            <a:schemeClr val="lt1"/>
-          </a:fontRef>
-        </p:style>
-        <p:txBody>
-          <a:bodyPr rtlCol="0" anchor="ctr"/>
-          <a:lstStyle/>
-          <a:p>
-            <a:pPr algn="ctr"/>
-            <a:endParaRPr lang="en-US"/>
-          </a:p>
-        </p:txBody>
-      </p:sp>
-      <p:pic>
-        <p:nvPicPr>
-          <p:cNvPr id="5" name="Picture 2" descr="https://cdn-images-1.medium.com/max/1000/1*ZCjPUFrB6eHPRi4eyP6aaA.gif">
-            <a:extLst>
-              <a:ext uri="{FF2B5EF4-FFF2-40B4-BE49-F238E27FC236}">
-                <a16:creationId xmlns:a16="http://schemas.microsoft.com/office/drawing/2014/main" id="{D515A69A-D594-4869-9F95-F42F319ADB6C}"/>
-              </a:ext>
-            </a:extLst>
-          </p:cNvPr>
-          <p:cNvPicPr>
-            <a:picLocks noChangeAspect="1" noChangeArrowheads="1" noCrop="1"/>
-          </p:cNvPicPr>
-          <p:nvPr/>
-        </p:nvPicPr>
-        <p:blipFill>
-          <a:blip r:embed="rId3">
-            <a:extLst>
-              <a:ext uri="{28A0092B-C50C-407E-A947-70E740481C1C}">
-                <a14:useLocalDpi xmlns:a14="http://schemas.microsoft.com/office/drawing/2010/main" val="0"/>
-              </a:ext>
-            </a:extLst>
-          </a:blip>
-          <a:srcRect/>
-          <a:stretch>
-            <a:fillRect/>
-          </a:stretch>
-        </p:blipFill>
-        <p:spPr bwMode="auto">
-          <a:xfrm>
-            <a:off x="7060689" y="1834290"/>
-            <a:ext cx="4163991" cy="3039871"/>
-          </a:xfrm>
-          <a:prstGeom prst="rect">
-            <a:avLst/>
-          </a:prstGeom>
-          <a:noFill/>
-          <a:effectLst/>
-          <a:extLst>
-            <a:ext uri="{909E8E84-426E-40DD-AFC4-6F175D3DCCD1}">
-              <a14:hiddenFill xmlns:a14="http://schemas.microsoft.com/office/drawing/2010/main">
-                <a:solidFill>
-                  <a:srgbClr val="FFFFFF"/>
-                </a:solidFill>
-              </a14:hiddenFill>
-            </a:ext>
-          </a:extLst>
-        </p:spPr>
-      </p:pic>
-      <p:sp>
-        <p:nvSpPr>
-          <p:cNvPr id="14" name="Rectangle 13">
-            <a:extLst>
-              <a:ext uri="{FF2B5EF4-FFF2-40B4-BE49-F238E27FC236}">
-                <a16:creationId xmlns:a16="http://schemas.microsoft.com/office/drawing/2014/main" id="{B0BCBBE0-549F-4678-BF52-43A69367C983}"/>
-              </a:ext>
-              <a:ext uri="{C183D7F6-B498-43B3-948B-1728B52AA6E4}">
-                <adec:decorative xmlns:adec="http://schemas.microsoft.com/office/drawing/2017/decorative" xmlns="" val="1"/>
-              </a:ext>
-            </a:extLst>
-          </p:cNvPr>
-          <p:cNvSpPr>
-            <a:spLocks noGrp="1" noRot="1" noChangeAspect="1" noMove="1" noResize="1" noEditPoints="1" noAdjustHandles="1" noChangeArrowheads="1" noChangeShapeType="1" noTextEdit="1"/>
-          </p:cNvSpPr>
-          <p:nvPr>
-            <p:extLst>
-              <p:ext uri="{386F3935-93C4-4BCD-93E2-E3B085C9AB24}">
-                <p16:designElem xmlns:p16="http://schemas.microsoft.com/office/powerpoint/2015/main" val="1"/>
-              </p:ext>
-            </p:extLst>
-          </p:nvPr>
-        </p:nvSpPr>
-        <p:spPr>
-          <a:xfrm>
-            <a:off x="10442448" y="0"/>
-            <a:ext cx="685800" cy="1143000"/>
-          </a:xfrm>
-          <a:prstGeom prst="rect">
-            <a:avLst/>
-          </a:prstGeom>
-          <a:solidFill>
-            <a:schemeClr val="accent1"/>
-          </a:solidFill>
-          <a:ln>
-            <a:noFill/>
-          </a:ln>
-        </p:spPr>
-        <p:style>
-          <a:lnRef idx="1">
-            <a:schemeClr val="accent1"/>
-          </a:lnRef>
-          <a:fillRef idx="3">
-            <a:schemeClr val="accent1"/>
-          </a:fillRef>
-          <a:effectRef idx="2">
-            <a:schemeClr val="accent1"/>
-          </a:effectRef>
-          <a:fontRef idx="minor">
-            <a:schemeClr val="lt1"/>
-          </a:fontRef>
-        </p:style>
-      </p:sp>
-    </p:spTree>
-    <p:extLst>
-      <p:ext uri="{BB962C8B-B14F-4D97-AF65-F5344CB8AC3E}">
-        <p14:creationId xmlns:p14="http://schemas.microsoft.com/office/powerpoint/2010/main" val="1486300628"/>
       </p:ext>
     </p:extLst>
   </p:cSld>
@@ -11858,7 +12988,7 @@
           <p:cNvPr id="2" name="Title 1">
             <a:extLst>
               <a:ext uri="{FF2B5EF4-FFF2-40B4-BE49-F238E27FC236}">
-                <a16:creationId xmlns:a16="http://schemas.microsoft.com/office/drawing/2014/main" id="{B7803FDF-1BD7-4C93-B725-D99252974604}"/>
+                <a16:creationId xmlns:a16="http://schemas.microsoft.com/office/drawing/2014/main" id="{E977E6C3-BEA0-4FC0-B517-55EB4C7604F8}"/>
               </a:ext>
             </a:extLst>
           </p:cNvPr>
@@ -11871,8 +13001,8 @@
         </p:nvSpPr>
         <p:spPr>
           <a:xfrm>
-            <a:off x="648929" y="629266"/>
-            <a:ext cx="4944152" cy="1622321"/>
+            <a:off x="646112" y="452718"/>
+            <a:ext cx="4165580" cy="1400530"/>
           </a:xfrm>
         </p:spPr>
         <p:txBody>
@@ -11883,73 +13013,20 @@
           <a:p>
             <a:r>
               <a:rPr lang="en-US" dirty="0"/>
-              <a:t>Max Pooling with CNN’s</a:t>
+              <a:t>Some filters</a:t>
             </a:r>
           </a:p>
         </p:txBody>
       </p:sp>
       <p:sp>
         <p:nvSpPr>
-          <p:cNvPr id="3" name="Content Placeholder 2">
+          <p:cNvPr id="75" name="Freeform 23">
             <a:extLst>
               <a:ext uri="{FF2B5EF4-FFF2-40B4-BE49-F238E27FC236}">
-                <a16:creationId xmlns:a16="http://schemas.microsoft.com/office/drawing/2014/main" id="{6D66A8C2-C0C3-4FD5-B0FE-3BD80AF9489F}"/>
-              </a:ext>
-            </a:extLst>
-          </p:cNvPr>
-          <p:cNvSpPr>
-            <a:spLocks noGrp="1"/>
-          </p:cNvSpPr>
-          <p:nvPr>
-            <p:ph idx="1"/>
-          </p:nvPr>
-        </p:nvSpPr>
-        <p:spPr>
-          <a:xfrm>
-            <a:off x="648930" y="2438400"/>
-            <a:ext cx="4944151" cy="3785419"/>
-          </a:xfrm>
-        </p:spPr>
-        <p:txBody>
-          <a:bodyPr>
-            <a:normAutofit/>
-          </a:bodyPr>
-          <a:lstStyle/>
-          <a:p>
-            <a:r>
-              <a:rPr lang="en-US" dirty="0"/>
-              <a:t>A layer in a convolutional network</a:t>
-            </a:r>
-          </a:p>
-          <a:p>
-            <a:r>
-              <a:rPr lang="en-US" dirty="0"/>
-              <a:t>Takes the output layers and applies down sampling</a:t>
-            </a:r>
-          </a:p>
-          <a:p>
-            <a:r>
-              <a:rPr lang="en-US" dirty="0"/>
-              <a:t>In this example, only the locations on the image that showed the strongest correlation to each feature are preserved</a:t>
-            </a:r>
-          </a:p>
-          <a:p>
-            <a:r>
-              <a:rPr lang="en-US" dirty="0"/>
-              <a:t>Allows lesser values to be lost, decreasing the amount of storage and processing</a:t>
-            </a:r>
-          </a:p>
-        </p:txBody>
-      </p:sp>
-      <p:sp>
-        <p:nvSpPr>
-          <p:cNvPr id="135" name="Rectangle 134">
-            <a:extLst>
-              <a:ext uri="{FF2B5EF4-FFF2-40B4-BE49-F238E27FC236}">
-                <a16:creationId xmlns:a16="http://schemas.microsoft.com/office/drawing/2014/main" id="{B1C2DFB7-5186-4D49-B5A6-99BDF443A48D}"/>
+                <a16:creationId xmlns:a16="http://schemas.microsoft.com/office/drawing/2014/main" id="{2142F58F-1A18-445C-8057-25B9F986C282}"/>
               </a:ext>
               <a:ext uri="{C183D7F6-B498-43B3-948B-1728B52AA6E4}">
-                <adec:decorative xmlns:adec="http://schemas.microsoft.com/office/drawing/2017/decorative" xmlns="" val="1"/>
+                <adec:decorative xmlns:adec="http://schemas.microsoft.com/office/drawing/2017/decorative" val="1"/>
               </a:ext>
             </a:extLst>
           </p:cNvPr>
@@ -11966,453 +13043,7 @@
         </p:nvSpPr>
         <p:spPr>
           <a:xfrm>
-            <a:off x="6092950" y="0"/>
-            <a:ext cx="6099050" cy="6858000"/>
-          </a:xfrm>
-          <a:prstGeom prst="rect">
-            <a:avLst/>
-          </a:prstGeom>
-          <a:solidFill>
-            <a:srgbClr val="FFFFFF"/>
-          </a:solidFill>
-          <a:ln>
-            <a:noFill/>
-          </a:ln>
-        </p:spPr>
-        <p:style>
-          <a:lnRef idx="2">
-            <a:schemeClr val="accent1">
-              <a:shade val="50000"/>
-            </a:schemeClr>
-          </a:lnRef>
-          <a:fillRef idx="1">
-            <a:schemeClr val="accent1"/>
-          </a:fillRef>
-          <a:effectRef idx="0">
-            <a:schemeClr val="accent1"/>
-          </a:effectRef>
-          <a:fontRef idx="minor">
-            <a:schemeClr val="lt1"/>
-          </a:fontRef>
-        </p:style>
-        <p:txBody>
-          <a:bodyPr rtlCol="0" anchor="ctr"/>
-          <a:lstStyle/>
-          <a:p>
-            <a:pPr algn="ctr"/>
-            <a:endParaRPr lang="en-US"/>
-          </a:p>
-        </p:txBody>
-      </p:sp>
-      <p:sp>
-        <p:nvSpPr>
-          <p:cNvPr id="137" name="Rounded Rectangle 9">
-            <a:extLst>
-              <a:ext uri="{FF2B5EF4-FFF2-40B4-BE49-F238E27FC236}">
-                <a16:creationId xmlns:a16="http://schemas.microsoft.com/office/drawing/2014/main" id="{8E46F046-D267-4952-A9CF-D2E73187A6A4}"/>
-              </a:ext>
-              <a:ext uri="{C183D7F6-B498-43B3-948B-1728B52AA6E4}">
-                <adec:decorative xmlns:adec="http://schemas.microsoft.com/office/drawing/2017/decorative" xmlns="" val="1"/>
-              </a:ext>
-            </a:extLst>
-          </p:cNvPr>
-          <p:cNvSpPr>
-            <a:spLocks noGrp="1" noRot="1" noChangeAspect="1" noMove="1" noResize="1" noEditPoints="1" noAdjustHandles="1" noChangeArrowheads="1" noChangeShapeType="1" noTextEdit="1"/>
-          </p:cNvSpPr>
-          <p:nvPr>
-            <p:extLst>
-              <p:ext uri="{386F3935-93C4-4BCD-93E2-E3B085C9AB24}">
-                <p16:designElem xmlns:p16="http://schemas.microsoft.com/office/powerpoint/2015/main" val="1"/>
-              </p:ext>
-            </p:extLst>
-          </p:nvPr>
-        </p:nvSpPr>
-        <p:spPr>
-          <a:xfrm>
-            <a:off x="6577582" y="484632"/>
-            <a:ext cx="5130204" cy="5739187"/>
-          </a:xfrm>
-          <a:prstGeom prst="roundRect">
-            <a:avLst>
-              <a:gd name="adj" fmla="val 0"/>
-            </a:avLst>
-          </a:prstGeom>
-          <a:solidFill>
-            <a:schemeClr val="tx1"/>
-          </a:solidFill>
-          <a:ln w="12700">
-            <a:solidFill>
-              <a:schemeClr val="tx2">
-                <a:lumMod val="75000"/>
-              </a:schemeClr>
-            </a:solidFill>
-          </a:ln>
-          <a:effectLst>
-            <a:outerShdw blurRad="50800" dist="50800" dir="5400000" algn="tl" rotWithShape="0">
-              <a:srgbClr val="000000">
-                <a:alpha val="43000"/>
-              </a:srgbClr>
-            </a:outerShdw>
-          </a:effectLst>
-        </p:spPr>
-        <p:style>
-          <a:lnRef idx="2">
-            <a:schemeClr val="accent1">
-              <a:shade val="50000"/>
-            </a:schemeClr>
-          </a:lnRef>
-          <a:fillRef idx="1">
-            <a:schemeClr val="accent1"/>
-          </a:fillRef>
-          <a:effectRef idx="0">
-            <a:schemeClr val="accent1"/>
-          </a:effectRef>
-          <a:fontRef idx="minor">
-            <a:schemeClr val="lt1"/>
-          </a:fontRef>
-        </p:style>
-        <p:txBody>
-          <a:bodyPr rtlCol="0" anchor="ctr"/>
-          <a:lstStyle/>
-          <a:p>
-            <a:pPr algn="ctr"/>
-            <a:endParaRPr lang="en-US"/>
-          </a:p>
-        </p:txBody>
-      </p:sp>
-      <p:pic>
-        <p:nvPicPr>
-          <p:cNvPr id="3074" name="Picture 2" descr="max pooling">
-            <a:extLst>
-              <a:ext uri="{FF2B5EF4-FFF2-40B4-BE49-F238E27FC236}">
-                <a16:creationId xmlns:a16="http://schemas.microsoft.com/office/drawing/2014/main" id="{B963B401-A483-4BCB-B368-3688C3523C9C}"/>
-              </a:ext>
-            </a:extLst>
-          </p:cNvPr>
-          <p:cNvPicPr>
-            <a:picLocks noChangeAspect="1" noChangeArrowheads="1"/>
-          </p:cNvPicPr>
-          <p:nvPr/>
-        </p:nvPicPr>
-        <p:blipFill>
-          <a:blip r:embed="rId3">
-            <a:extLst>
-              <a:ext uri="{28A0092B-C50C-407E-A947-70E740481C1C}">
-                <a14:useLocalDpi xmlns:a14="http://schemas.microsoft.com/office/drawing/2010/main" val="0"/>
-              </a:ext>
-            </a:extLst>
-          </a:blip>
-          <a:srcRect/>
-          <a:stretch>
-            <a:fillRect/>
-          </a:stretch>
-        </p:blipFill>
-        <p:spPr bwMode="auto">
-          <a:xfrm>
-            <a:off x="7060689" y="2349663"/>
-            <a:ext cx="4163991" cy="2009125"/>
-          </a:xfrm>
-          <a:prstGeom prst="rect">
-            <a:avLst/>
-          </a:prstGeom>
-          <a:noFill/>
-          <a:effectLst/>
-          <a:extLst>
-            <a:ext uri="{909E8E84-426E-40DD-AFC4-6F175D3DCCD1}">
-              <a14:hiddenFill xmlns:a14="http://schemas.microsoft.com/office/drawing/2010/main">
-                <a:solidFill>
-                  <a:srgbClr val="FFFFFF"/>
-                </a:solidFill>
-              </a14:hiddenFill>
-            </a:ext>
-          </a:extLst>
-        </p:spPr>
-      </p:pic>
-      <p:sp>
-        <p:nvSpPr>
-          <p:cNvPr id="139" name="Rectangle 138">
-            <a:extLst>
-              <a:ext uri="{FF2B5EF4-FFF2-40B4-BE49-F238E27FC236}">
-                <a16:creationId xmlns:a16="http://schemas.microsoft.com/office/drawing/2014/main" id="{B0BCBBE0-549F-4678-BF52-43A69367C983}"/>
-              </a:ext>
-              <a:ext uri="{C183D7F6-B498-43B3-948B-1728B52AA6E4}">
-                <adec:decorative xmlns:adec="http://schemas.microsoft.com/office/drawing/2017/decorative" xmlns="" val="1"/>
-              </a:ext>
-            </a:extLst>
-          </p:cNvPr>
-          <p:cNvSpPr>
-            <a:spLocks noGrp="1" noRot="1" noChangeAspect="1" noMove="1" noResize="1" noEditPoints="1" noAdjustHandles="1" noChangeArrowheads="1" noChangeShapeType="1" noTextEdit="1"/>
-          </p:cNvSpPr>
-          <p:nvPr>
-            <p:extLst>
-              <p:ext uri="{386F3935-93C4-4BCD-93E2-E3B085C9AB24}">
-                <p16:designElem xmlns:p16="http://schemas.microsoft.com/office/powerpoint/2015/main" val="1"/>
-              </p:ext>
-            </p:extLst>
-          </p:nvPr>
-        </p:nvSpPr>
-        <p:spPr>
-          <a:xfrm>
-            <a:off x="10442448" y="0"/>
-            <a:ext cx="685800" cy="1143000"/>
-          </a:xfrm>
-          <a:prstGeom prst="rect">
-            <a:avLst/>
-          </a:prstGeom>
-          <a:solidFill>
-            <a:schemeClr val="accent1"/>
-          </a:solidFill>
-          <a:ln>
-            <a:noFill/>
-          </a:ln>
-        </p:spPr>
-        <p:style>
-          <a:lnRef idx="1">
-            <a:schemeClr val="accent1"/>
-          </a:lnRef>
-          <a:fillRef idx="3">
-            <a:schemeClr val="accent1"/>
-          </a:fillRef>
-          <a:effectRef idx="2">
-            <a:schemeClr val="accent1"/>
-          </a:effectRef>
-          <a:fontRef idx="minor">
-            <a:schemeClr val="lt1"/>
-          </a:fontRef>
-        </p:style>
-      </p:sp>
-    </p:spTree>
-    <p:extLst>
-      <p:ext uri="{BB962C8B-B14F-4D97-AF65-F5344CB8AC3E}">
-        <p14:creationId xmlns:p14="http://schemas.microsoft.com/office/powerpoint/2010/main" val="1423749011"/>
-      </p:ext>
-    </p:extLst>
-  </p:cSld>
-  <p:clrMapOvr>
-    <a:masterClrMapping/>
-  </p:clrMapOvr>
-</p:sld>
-</file>
-
-<file path=ppt/slides/slide7.xml><?xml version="1.0" encoding="utf-8"?>
-<p:sld xmlns:a="http://schemas.openxmlformats.org/drawingml/2006/main" xmlns:r="http://schemas.openxmlformats.org/officeDocument/2006/relationships" xmlns:p="http://schemas.openxmlformats.org/presentationml/2006/main">
-  <p:cSld>
-    <p:spTree>
-      <p:nvGrpSpPr>
-        <p:cNvPr id="1" name=""/>
-        <p:cNvGrpSpPr/>
-        <p:nvPr/>
-      </p:nvGrpSpPr>
-      <p:grpSpPr>
-        <a:xfrm>
-          <a:off x="0" y="0"/>
-          <a:ext cx="0" cy="0"/>
-          <a:chOff x="0" y="0"/>
-          <a:chExt cx="0" cy="0"/>
-        </a:xfrm>
-      </p:grpSpPr>
-      <p:sp>
-        <p:nvSpPr>
-          <p:cNvPr id="2" name="Title 1">
-            <a:extLst>
-              <a:ext uri="{FF2B5EF4-FFF2-40B4-BE49-F238E27FC236}">
-                <a16:creationId xmlns:a16="http://schemas.microsoft.com/office/drawing/2014/main" id="{C2B7A7A0-D3AA-4C42-9AE5-446818ED97EA}"/>
-              </a:ext>
-            </a:extLst>
-          </p:cNvPr>
-          <p:cNvSpPr>
-            <a:spLocks noGrp="1"/>
-          </p:cNvSpPr>
-          <p:nvPr>
-            <p:ph type="title"/>
-          </p:nvPr>
-        </p:nvSpPr>
-        <p:spPr/>
-        <p:txBody>
-          <a:bodyPr/>
-          <a:lstStyle/>
-          <a:p>
-            <a:r>
-              <a:rPr lang="en-US" dirty="0"/>
-              <a:t>A typical CNN</a:t>
-            </a:r>
-          </a:p>
-        </p:txBody>
-      </p:sp>
-      <p:pic>
-        <p:nvPicPr>
-          <p:cNvPr id="5122" name="Picture 2" descr="https://cs231n.github.io/assets/cnn/convnet.jpeg">
-            <a:extLst>
-              <a:ext uri="{FF2B5EF4-FFF2-40B4-BE49-F238E27FC236}">
-                <a16:creationId xmlns:a16="http://schemas.microsoft.com/office/drawing/2014/main" id="{8FE2454C-DFD6-4A89-ACE3-061C76EC15B9}"/>
-              </a:ext>
-            </a:extLst>
-          </p:cNvPr>
-          <p:cNvPicPr>
-            <a:picLocks noGrp="1" noChangeAspect="1" noChangeArrowheads="1"/>
-          </p:cNvPicPr>
-          <p:nvPr>
-            <p:ph idx="1"/>
-          </p:nvPr>
-        </p:nvPicPr>
-        <p:blipFill>
-          <a:blip r:embed="rId2">
-            <a:extLst>
-              <a:ext uri="{28A0092B-C50C-407E-A947-70E740481C1C}">
-                <a14:useLocalDpi xmlns:a14="http://schemas.microsoft.com/office/drawing/2010/main" val="0"/>
-              </a:ext>
-            </a:extLst>
-          </a:blip>
-          <a:srcRect/>
-          <a:stretch>
-            <a:fillRect/>
-          </a:stretch>
-        </p:blipFill>
-        <p:spPr bwMode="auto">
-          <a:xfrm>
-            <a:off x="1582202" y="1853248"/>
-            <a:ext cx="8761532" cy="4195762"/>
-          </a:xfrm>
-          <a:prstGeom prst="rect">
-            <a:avLst/>
-          </a:prstGeom>
-          <a:noFill/>
-          <a:extLst>
-            <a:ext uri="{909E8E84-426E-40DD-AFC4-6F175D3DCCD1}">
-              <a14:hiddenFill xmlns:a14="http://schemas.microsoft.com/office/drawing/2010/main">
-                <a:solidFill>
-                  <a:srgbClr val="FFFFFF"/>
-                </a:solidFill>
-              </a14:hiddenFill>
-            </a:ext>
-          </a:extLst>
-        </p:spPr>
-      </p:pic>
-    </p:spTree>
-    <p:extLst>
-      <p:ext uri="{BB962C8B-B14F-4D97-AF65-F5344CB8AC3E}">
-        <p14:creationId xmlns:p14="http://schemas.microsoft.com/office/powerpoint/2010/main" val="2603992973"/>
-      </p:ext>
-    </p:extLst>
-  </p:cSld>
-  <p:clrMapOvr>
-    <a:masterClrMapping/>
-  </p:clrMapOvr>
-</p:sld>
-</file>
-
-<file path=ppt/slides/slide8.xml><?xml version="1.0" encoding="utf-8"?>
-<p:sld xmlns:a="http://schemas.openxmlformats.org/drawingml/2006/main" xmlns:r="http://schemas.openxmlformats.org/officeDocument/2006/relationships" xmlns:p="http://schemas.openxmlformats.org/presentationml/2006/main">
-  <p:cSld>
-    <p:bg>
-      <p:bgPr>
-        <a:blipFill rotWithShape="1">
-          <a:blip r:embed="rId2">
-            <a:duotone>
-              <a:schemeClr val="bg2">
-                <a:shade val="62000"/>
-                <a:hueMod val="108000"/>
-                <a:satMod val="164000"/>
-                <a:lumMod val="69000"/>
-              </a:schemeClr>
-              <a:schemeClr val="bg2">
-                <a:tint val="96000"/>
-                <a:hueMod val="90000"/>
-                <a:satMod val="130000"/>
-                <a:lumMod val="134000"/>
-              </a:schemeClr>
-            </a:duotone>
-            <a:extLst/>
-          </a:blip>
-          <a:stretch/>
-        </a:blipFill>
-        <a:effectLst/>
-      </p:bgPr>
-    </p:bg>
-    <p:spTree>
-      <p:nvGrpSpPr>
-        <p:cNvPr id="1" name=""/>
-        <p:cNvGrpSpPr/>
-        <p:nvPr/>
-      </p:nvGrpSpPr>
-      <p:grpSpPr>
-        <a:xfrm>
-          <a:off x="0" y="0"/>
-          <a:ext cx="0" cy="0"/>
-          <a:chOff x="0" y="0"/>
-          <a:chExt cx="0" cy="0"/>
-        </a:xfrm>
-      </p:grpSpPr>
-      <p:sp>
-        <p:nvSpPr>
-          <p:cNvPr id="2" name="Title 1">
-            <a:extLst>
-              <a:ext uri="{FF2B5EF4-FFF2-40B4-BE49-F238E27FC236}">
-                <a16:creationId xmlns:a16="http://schemas.microsoft.com/office/drawing/2014/main" id="{BF64BB4E-0027-41C8-80F9-D4450C0CC1DA}"/>
-              </a:ext>
-            </a:extLst>
-          </p:cNvPr>
-          <p:cNvSpPr>
-            <a:spLocks noGrp="1"/>
-          </p:cNvSpPr>
-          <p:nvPr>
-            <p:ph type="title"/>
-          </p:nvPr>
-        </p:nvSpPr>
-        <p:spPr>
-          <a:xfrm>
-            <a:off x="646112" y="452718"/>
-            <a:ext cx="5629222" cy="1400530"/>
-          </a:xfrm>
-        </p:spPr>
-        <p:txBody>
-          <a:bodyPr>
-            <a:normAutofit/>
-          </a:bodyPr>
-          <a:lstStyle/>
-          <a:p>
-            <a:r>
-              <a:rPr lang="en-US" dirty="0" err="1"/>
-              <a:t>TensorFlow</a:t>
-            </a:r>
-            <a:r>
-              <a:rPr lang="en-US" dirty="0"/>
-              <a:t> and </a:t>
-            </a:r>
-            <a:r>
-              <a:rPr lang="en-US" dirty="0" err="1"/>
-              <a:t>Keras</a:t>
-            </a:r>
-            <a:endParaRPr lang="en-US" dirty="0"/>
-          </a:p>
-        </p:txBody>
-      </p:sp>
-      <p:sp>
-        <p:nvSpPr>
-          <p:cNvPr id="73" name="Freeform 7">
-            <a:extLst>
-              <a:ext uri="{FF2B5EF4-FFF2-40B4-BE49-F238E27FC236}">
-                <a16:creationId xmlns:a16="http://schemas.microsoft.com/office/drawing/2014/main" id="{053E741A-7A7D-46A0-ACB7-0736C3293471}"/>
-              </a:ext>
-              <a:ext uri="{C183D7F6-B498-43B3-948B-1728B52AA6E4}">
-                <adec:decorative xmlns:adec="http://schemas.microsoft.com/office/drawing/2017/decorative" xmlns="" val="1"/>
-              </a:ext>
-            </a:extLst>
-          </p:cNvPr>
-          <p:cNvSpPr>
-            <a:spLocks noGrp="1" noRot="1" noChangeAspect="1" noMove="1" noResize="1" noEditPoints="1" noAdjustHandles="1" noChangeArrowheads="1" noChangeShapeType="1" noTextEdit="1"/>
-          </p:cNvSpPr>
-          <p:nvPr>
-            <p:extLst>
-              <p:ext uri="{386F3935-93C4-4BCD-93E2-E3B085C9AB24}">
-                <p16:designElem xmlns:p16="http://schemas.microsoft.com/office/powerpoint/2015/main" val="1"/>
-              </p:ext>
-            </p:extLst>
-          </p:nvPr>
-        </p:nvSpPr>
-        <p:spPr>
-          <a:xfrm>
-            <a:off x="6449843" y="-1"/>
+            <a:off x="4994020" y="-1"/>
             <a:ext cx="559472" cy="3709642"/>
           </a:xfrm>
           <a:custGeom>
@@ -12741,13 +13372,13 @@
       </p:sp>
       <p:sp>
         <p:nvSpPr>
-          <p:cNvPr id="75" name="Rectangle 74">
+          <p:cNvPr id="77" name="Freeform 5">
             <a:extLst>
               <a:ext uri="{FF2B5EF4-FFF2-40B4-BE49-F238E27FC236}">
-                <a16:creationId xmlns:a16="http://schemas.microsoft.com/office/drawing/2014/main" id="{9C61CB9C-DF84-425E-928F-6B6ABABCEC50}"/>
+                <a16:creationId xmlns:a16="http://schemas.microsoft.com/office/drawing/2014/main" id="{2C8825F8-2BBE-4F09-844D-BD569EE90A57}"/>
               </a:ext>
               <a:ext uri="{C183D7F6-B498-43B3-948B-1728B52AA6E4}">
-                <adec:decorative xmlns:adec="http://schemas.microsoft.com/office/drawing/2017/decorative" xmlns="" val="1"/>
+                <adec:decorative xmlns:adec="http://schemas.microsoft.com/office/drawing/2017/decorative" val="1"/>
               </a:ext>
             </a:extLst>
           </p:cNvPr>
@@ -12762,10 +13393,211 @@
             </p:extLst>
           </p:nvPr>
         </p:nvSpPr>
+        <p:spPr bwMode="gray">
+          <a:xfrm rot="16200000">
+            <a:off x="2450577" y="2756642"/>
+            <a:ext cx="6858000" cy="1344715"/>
+          </a:xfrm>
+          <a:custGeom>
+            <a:avLst/>
+            <a:gdLst/>
+            <a:ahLst/>
+            <a:cxnLst/>
+            <a:rect l="l" t="t" r="r" b="b"/>
+            <a:pathLst>
+              <a:path w="10000" h="8000">
+                <a:moveTo>
+                  <a:pt x="0" y="0"/>
+                </a:moveTo>
+                <a:lnTo>
+                  <a:pt x="0" y="7970"/>
+                </a:lnTo>
+                <a:lnTo>
+                  <a:pt x="10000" y="8000"/>
+                </a:lnTo>
+                <a:lnTo>
+                  <a:pt x="10000" y="7"/>
+                </a:lnTo>
+                <a:lnTo>
+                  <a:pt x="10000" y="7"/>
+                </a:lnTo>
+                <a:lnTo>
+                  <a:pt x="9773" y="156"/>
+                </a:lnTo>
+                <a:lnTo>
+                  <a:pt x="9547" y="298"/>
+                </a:lnTo>
+                <a:lnTo>
+                  <a:pt x="9320" y="437"/>
+                </a:lnTo>
+                <a:lnTo>
+                  <a:pt x="9092" y="556"/>
+                </a:lnTo>
+                <a:lnTo>
+                  <a:pt x="8865" y="676"/>
+                </a:lnTo>
+                <a:lnTo>
+                  <a:pt x="8637" y="788"/>
+                </a:lnTo>
+                <a:lnTo>
+                  <a:pt x="8412" y="884"/>
+                </a:lnTo>
+                <a:lnTo>
+                  <a:pt x="8184" y="975"/>
+                </a:lnTo>
+                <a:lnTo>
+                  <a:pt x="7957" y="1058"/>
+                </a:lnTo>
+                <a:lnTo>
+                  <a:pt x="7734" y="1130"/>
+                </a:lnTo>
+                <a:lnTo>
+                  <a:pt x="7508" y="1202"/>
+                </a:lnTo>
+                <a:lnTo>
+                  <a:pt x="7285" y="1262"/>
+                </a:lnTo>
+                <a:lnTo>
+                  <a:pt x="7062" y="1309"/>
+                </a:lnTo>
+                <a:lnTo>
+                  <a:pt x="6840" y="1358"/>
+                </a:lnTo>
+                <a:lnTo>
+                  <a:pt x="6620" y="1399"/>
+                </a:lnTo>
+                <a:lnTo>
+                  <a:pt x="6402" y="1428"/>
+                </a:lnTo>
+                <a:lnTo>
+                  <a:pt x="6184" y="1453"/>
+                </a:lnTo>
+                <a:lnTo>
+                  <a:pt x="5968" y="1477"/>
+                </a:lnTo>
+                <a:lnTo>
+                  <a:pt x="5755" y="1488"/>
+                </a:lnTo>
+                <a:lnTo>
+                  <a:pt x="5542" y="1500"/>
+                </a:lnTo>
+                <a:lnTo>
+                  <a:pt x="5332" y="1506"/>
+                </a:lnTo>
+                <a:lnTo>
+                  <a:pt x="5124" y="1500"/>
+                </a:lnTo>
+                <a:lnTo>
+                  <a:pt x="4918" y="1500"/>
+                </a:lnTo>
+                <a:lnTo>
+                  <a:pt x="4714" y="1488"/>
+                </a:lnTo>
+                <a:lnTo>
+                  <a:pt x="4514" y="1470"/>
+                </a:lnTo>
+                <a:lnTo>
+                  <a:pt x="4316" y="1453"/>
+                </a:lnTo>
+                <a:lnTo>
+                  <a:pt x="4122" y="1434"/>
+                </a:lnTo>
+                <a:lnTo>
+                  <a:pt x="3929" y="1405"/>
+                </a:lnTo>
+                <a:lnTo>
+                  <a:pt x="3739" y="1374"/>
+                </a:lnTo>
+                <a:lnTo>
+                  <a:pt x="3553" y="1346"/>
+                </a:lnTo>
+                <a:lnTo>
+                  <a:pt x="3190" y="1267"/>
+                </a:lnTo>
+                <a:lnTo>
+                  <a:pt x="2842" y="1183"/>
+                </a:lnTo>
+                <a:lnTo>
+                  <a:pt x="2508" y="1095"/>
+                </a:lnTo>
+                <a:lnTo>
+                  <a:pt x="2192" y="998"/>
+                </a:lnTo>
+                <a:lnTo>
+                  <a:pt x="1890" y="897"/>
+                </a:lnTo>
+                <a:lnTo>
+                  <a:pt x="1610" y="788"/>
+                </a:lnTo>
+                <a:lnTo>
+                  <a:pt x="1347" y="681"/>
+                </a:lnTo>
+                <a:lnTo>
+                  <a:pt x="1105" y="574"/>
+                </a:lnTo>
+                <a:lnTo>
+                  <a:pt x="883" y="473"/>
+                </a:lnTo>
+                <a:lnTo>
+                  <a:pt x="686" y="377"/>
+                </a:lnTo>
+                <a:lnTo>
+                  <a:pt x="508" y="286"/>
+                </a:lnTo>
+                <a:lnTo>
+                  <a:pt x="358" y="210"/>
+                </a:lnTo>
+                <a:lnTo>
+                  <a:pt x="232" y="138"/>
+                </a:lnTo>
+                <a:lnTo>
+                  <a:pt x="59" y="35"/>
+                </a:lnTo>
+                <a:lnTo>
+                  <a:pt x="0" y="0"/>
+                </a:lnTo>
+                <a:lnTo>
+                  <a:pt x="0" y="0"/>
+                </a:lnTo>
+                <a:close/>
+              </a:path>
+            </a:pathLst>
+          </a:custGeom>
+          <a:solidFill>
+            <a:srgbClr val="FFFFFF"/>
+          </a:solidFill>
+          <a:ln>
+            <a:noFill/>
+          </a:ln>
+        </p:spPr>
+      </p:sp>
+      <p:sp>
+        <p:nvSpPr>
+          <p:cNvPr id="79" name="Rectangle 78">
+            <a:extLst>
+              <a:ext uri="{FF2B5EF4-FFF2-40B4-BE49-F238E27FC236}">
+                <a16:creationId xmlns:a16="http://schemas.microsoft.com/office/drawing/2014/main" id="{1E0B305D-E4F9-4F9F-81CA-BDFBA88B2471}"/>
+              </a:ext>
+              <a:ext uri="{C183D7F6-B498-43B3-948B-1728B52AA6E4}">
+                <adec:decorative xmlns:adec="http://schemas.microsoft.com/office/drawing/2017/decorative" val="1"/>
+              </a:ext>
+            </a:extLst>
+          </p:cNvPr>
+          <p:cNvSpPr>
+            <a:spLocks noGrp="1" noRot="1" noChangeAspect="1" noMove="1" noResize="1" noEditPoints="1" noAdjustHandles="1" noChangeArrowheads="1" noChangeShapeType="1" noTextEdit="1"/>
+          </p:cNvSpPr>
+          <p:nvPr>
+            <p:extLst>
+              <p:ext uri="{386F3935-93C4-4BCD-93E2-E3B085C9AB24}">
+                <p16:designElem xmlns:p16="http://schemas.microsoft.com/office/powerpoint/2015/main" val="1"/>
+              </p:ext>
+            </p:extLst>
+          </p:nvPr>
+        </p:nvSpPr>
         <p:spPr>
           <a:xfrm>
-            <a:off x="7554139" y="0"/>
-            <a:ext cx="4638280" cy="6858000"/>
+            <a:off x="6094411" y="0"/>
+            <a:ext cx="6098008" cy="6858000"/>
           </a:xfrm>
           <a:prstGeom prst="rect">
             <a:avLst/>
@@ -12802,213 +13634,12 @@
           </a:p>
         </p:txBody>
       </p:sp>
-      <p:sp>
-        <p:nvSpPr>
-          <p:cNvPr id="77" name="Freeform 5">
+      <p:pic>
+        <p:nvPicPr>
+          <p:cNvPr id="1030" name="Picture 6" descr="https://www.saama.com/wp-content/uploads/2017/12/04.jpg">
             <a:extLst>
               <a:ext uri="{FF2B5EF4-FFF2-40B4-BE49-F238E27FC236}">
-                <a16:creationId xmlns:a16="http://schemas.microsoft.com/office/drawing/2014/main" id="{F7ECE4AC-C37F-40D5-9FE4-F07DE92F0A64}"/>
-              </a:ext>
-              <a:ext uri="{C183D7F6-B498-43B3-948B-1728B52AA6E4}">
-                <adec:decorative xmlns:adec="http://schemas.microsoft.com/office/drawing/2017/decorative" xmlns="" val="1"/>
-              </a:ext>
-            </a:extLst>
-          </p:cNvPr>
-          <p:cNvSpPr>
-            <a:spLocks noGrp="1" noRot="1" noChangeAspect="1" noMove="1" noResize="1" noEditPoints="1" noAdjustHandles="1" noChangeArrowheads="1" noChangeShapeType="1" noTextEdit="1"/>
-          </p:cNvSpPr>
-          <p:nvPr>
-            <p:extLst>
-              <p:ext uri="{386F3935-93C4-4BCD-93E2-E3B085C9AB24}">
-                <p16:designElem xmlns:p16="http://schemas.microsoft.com/office/powerpoint/2015/main" val="1"/>
-              </p:ext>
-            </p:extLst>
-          </p:nvPr>
-        </p:nvSpPr>
-        <p:spPr bwMode="gray">
-          <a:xfrm rot="16200000">
-            <a:off x="3906400" y="2756642"/>
-            <a:ext cx="6858000" cy="1344715"/>
-          </a:xfrm>
-          <a:custGeom>
-            <a:avLst/>
-            <a:gdLst/>
-            <a:ahLst/>
-            <a:cxnLst/>
-            <a:rect l="l" t="t" r="r" b="b"/>
-            <a:pathLst>
-              <a:path w="10000" h="8000">
-                <a:moveTo>
-                  <a:pt x="0" y="0"/>
-                </a:moveTo>
-                <a:lnTo>
-                  <a:pt x="0" y="7970"/>
-                </a:lnTo>
-                <a:lnTo>
-                  <a:pt x="10000" y="8000"/>
-                </a:lnTo>
-                <a:lnTo>
-                  <a:pt x="10000" y="7"/>
-                </a:lnTo>
-                <a:lnTo>
-                  <a:pt x="10000" y="7"/>
-                </a:lnTo>
-                <a:lnTo>
-                  <a:pt x="9773" y="156"/>
-                </a:lnTo>
-                <a:lnTo>
-                  <a:pt x="9547" y="298"/>
-                </a:lnTo>
-                <a:lnTo>
-                  <a:pt x="9320" y="437"/>
-                </a:lnTo>
-                <a:lnTo>
-                  <a:pt x="9092" y="556"/>
-                </a:lnTo>
-                <a:lnTo>
-                  <a:pt x="8865" y="676"/>
-                </a:lnTo>
-                <a:lnTo>
-                  <a:pt x="8637" y="788"/>
-                </a:lnTo>
-                <a:lnTo>
-                  <a:pt x="8412" y="884"/>
-                </a:lnTo>
-                <a:lnTo>
-                  <a:pt x="8184" y="975"/>
-                </a:lnTo>
-                <a:lnTo>
-                  <a:pt x="7957" y="1058"/>
-                </a:lnTo>
-                <a:lnTo>
-                  <a:pt x="7734" y="1130"/>
-                </a:lnTo>
-                <a:lnTo>
-                  <a:pt x="7508" y="1202"/>
-                </a:lnTo>
-                <a:lnTo>
-                  <a:pt x="7285" y="1262"/>
-                </a:lnTo>
-                <a:lnTo>
-                  <a:pt x="7062" y="1309"/>
-                </a:lnTo>
-                <a:lnTo>
-                  <a:pt x="6840" y="1358"/>
-                </a:lnTo>
-                <a:lnTo>
-                  <a:pt x="6620" y="1399"/>
-                </a:lnTo>
-                <a:lnTo>
-                  <a:pt x="6402" y="1428"/>
-                </a:lnTo>
-                <a:lnTo>
-                  <a:pt x="6184" y="1453"/>
-                </a:lnTo>
-                <a:lnTo>
-                  <a:pt x="5968" y="1477"/>
-                </a:lnTo>
-                <a:lnTo>
-                  <a:pt x="5755" y="1488"/>
-                </a:lnTo>
-                <a:lnTo>
-                  <a:pt x="5542" y="1500"/>
-                </a:lnTo>
-                <a:lnTo>
-                  <a:pt x="5332" y="1506"/>
-                </a:lnTo>
-                <a:lnTo>
-                  <a:pt x="5124" y="1500"/>
-                </a:lnTo>
-                <a:lnTo>
-                  <a:pt x="4918" y="1500"/>
-                </a:lnTo>
-                <a:lnTo>
-                  <a:pt x="4714" y="1488"/>
-                </a:lnTo>
-                <a:lnTo>
-                  <a:pt x="4514" y="1470"/>
-                </a:lnTo>
-                <a:lnTo>
-                  <a:pt x="4316" y="1453"/>
-                </a:lnTo>
-                <a:lnTo>
-                  <a:pt x="4122" y="1434"/>
-                </a:lnTo>
-                <a:lnTo>
-                  <a:pt x="3929" y="1405"/>
-                </a:lnTo>
-                <a:lnTo>
-                  <a:pt x="3739" y="1374"/>
-                </a:lnTo>
-                <a:lnTo>
-                  <a:pt x="3553" y="1346"/>
-                </a:lnTo>
-                <a:lnTo>
-                  <a:pt x="3190" y="1267"/>
-                </a:lnTo>
-                <a:lnTo>
-                  <a:pt x="2842" y="1183"/>
-                </a:lnTo>
-                <a:lnTo>
-                  <a:pt x="2508" y="1095"/>
-                </a:lnTo>
-                <a:lnTo>
-                  <a:pt x="2192" y="998"/>
-                </a:lnTo>
-                <a:lnTo>
-                  <a:pt x="1890" y="897"/>
-                </a:lnTo>
-                <a:lnTo>
-                  <a:pt x="1610" y="788"/>
-                </a:lnTo>
-                <a:lnTo>
-                  <a:pt x="1347" y="681"/>
-                </a:lnTo>
-                <a:lnTo>
-                  <a:pt x="1105" y="574"/>
-                </a:lnTo>
-                <a:lnTo>
-                  <a:pt x="883" y="473"/>
-                </a:lnTo>
-                <a:lnTo>
-                  <a:pt x="686" y="377"/>
-                </a:lnTo>
-                <a:lnTo>
-                  <a:pt x="508" y="286"/>
-                </a:lnTo>
-                <a:lnTo>
-                  <a:pt x="358" y="210"/>
-                </a:lnTo>
-                <a:lnTo>
-                  <a:pt x="232" y="138"/>
-                </a:lnTo>
-                <a:lnTo>
-                  <a:pt x="59" y="35"/>
-                </a:lnTo>
-                <a:lnTo>
-                  <a:pt x="0" y="0"/>
-                </a:lnTo>
-                <a:lnTo>
-                  <a:pt x="0" y="0"/>
-                </a:lnTo>
-                <a:close/>
-              </a:path>
-            </a:pathLst>
-          </a:custGeom>
-          <a:solidFill>
-            <a:srgbClr val="FFFFFF"/>
-          </a:solidFill>
-          <a:ln>
-            <a:noFill/>
-          </a:ln>
-        </p:spPr>
-      </p:sp>
-      <p:pic>
-        <p:nvPicPr>
-          <p:cNvPr id="6148" name="Picture 4" descr="Related image">
-            <a:extLst>
-              <a:ext uri="{FF2B5EF4-FFF2-40B4-BE49-F238E27FC236}">
-                <a16:creationId xmlns:a16="http://schemas.microsoft.com/office/drawing/2014/main" id="{E35E0086-52CC-4D0F-9C05-89D84E2B206C}"/>
+                <a16:creationId xmlns:a16="http://schemas.microsoft.com/office/drawing/2014/main" id="{139E4713-2AA9-4775-A32C-CA2F07FC93A8}"/>
               </a:ext>
             </a:extLst>
           </p:cNvPr>
@@ -13032,8 +13663,8 @@
         </p:blipFill>
         <p:spPr bwMode="auto">
           <a:xfrm>
-            <a:off x="7563742" y="715720"/>
-            <a:ext cx="3980139" cy="2547288"/>
+            <a:off x="7092854" y="768929"/>
+            <a:ext cx="3482004" cy="2567978"/>
           </a:xfrm>
           <a:prstGeom prst="rect">
             <a:avLst/>
@@ -13053,13 +13684,13 @@
       </p:pic>
       <p:sp>
         <p:nvSpPr>
-          <p:cNvPr id="79" name="Rectangle 78">
+          <p:cNvPr id="81" name="Rectangle 80">
             <a:extLst>
               <a:ext uri="{FF2B5EF4-FFF2-40B4-BE49-F238E27FC236}">
-                <a16:creationId xmlns:a16="http://schemas.microsoft.com/office/drawing/2014/main" id="{7B983088-62B5-4A2F-8098-BBF2121047C5}"/>
+                <a16:creationId xmlns:a16="http://schemas.microsoft.com/office/drawing/2014/main" id="{1D77C917-B31B-4151-9BB3-768748C42572}"/>
               </a:ext>
               <a:ext uri="{C183D7F6-B498-43B3-948B-1728B52AA6E4}">
-                <adec:decorative xmlns:adec="http://schemas.microsoft.com/office/drawing/2017/decorative" xmlns="" val="1"/>
+                <adec:decorative xmlns:adec="http://schemas.microsoft.com/office/drawing/2017/decorative" val="1"/>
               </a:ext>
             </a:extLst>
           </p:cNvPr>
@@ -13106,10 +13737,10 @@
       </p:sp>
       <p:sp>
         <p:nvSpPr>
-          <p:cNvPr id="3" name="Content Placeholder 2">
+          <p:cNvPr id="5" name="Content Placeholder 4">
             <a:extLst>
               <a:ext uri="{FF2B5EF4-FFF2-40B4-BE49-F238E27FC236}">
-                <a16:creationId xmlns:a16="http://schemas.microsoft.com/office/drawing/2014/main" id="{B33ACE97-82EA-48F7-B19F-B3E46A2C08A8}"/>
+                <a16:creationId xmlns:a16="http://schemas.microsoft.com/office/drawing/2014/main" id="{D3C55339-135E-4C51-912A-E51C3A24FC71}"/>
               </a:ext>
             </a:extLst>
           </p:cNvPr>
@@ -13122,8 +13753,8 @@
         </p:nvSpPr>
         <p:spPr>
           <a:xfrm>
-            <a:off x="646112" y="2052918"/>
-            <a:ext cx="5628635" cy="4195481"/>
+            <a:off x="646113" y="2052918"/>
+            <a:ext cx="4165146" cy="4195481"/>
           </a:xfrm>
         </p:spPr>
         <p:txBody>
@@ -13133,37 +13764,36 @@
           <a:lstStyle/>
           <a:p>
             <a:r>
-              <a:rPr lang="en-US" dirty="0" err="1"/>
-              <a:t>TensorFlow</a:t>
-            </a:r>
-            <a:r>
               <a:rPr lang="en-US" dirty="0"/>
-              <a:t> is an open-source software library for dataflow programming across a range of tasks… very used in machine learning applications</a:t>
-            </a:r>
-          </a:p>
-          <a:p>
-            <a:r>
-              <a:rPr lang="en-US" dirty="0" err="1"/>
-              <a:t>Keras</a:t>
-            </a:r>
+              <a:t>Sobel filter (edge detection)</a:t>
+            </a:r>
+          </a:p>
+          <a:p>
             <a:r>
               <a:rPr lang="en-US" dirty="0"/>
-              <a:t> is an open source neural network library written in Python. It runs on top of </a:t>
-            </a:r>
-            <a:r>
-              <a:rPr lang="en-US" dirty="0" err="1"/>
-              <a:t>TensorFlow</a:t>
-            </a:r>
+              <a:t>Sharpen an image filter</a:t>
+            </a:r>
+          </a:p>
+          <a:p>
+            <a:r>
+              <a:rPr lang="en-US" dirty="0"/>
+              <a:t>Many more… </a:t>
+            </a:r>
+          </a:p>
+          <a:p>
+            <a:pPr marL="0" indent="0">
+              <a:buNone/>
+            </a:pPr>
             <a:endParaRPr lang="en-US" dirty="0"/>
           </a:p>
         </p:txBody>
       </p:sp>
       <p:pic>
         <p:nvPicPr>
-          <p:cNvPr id="6146" name="Picture 2" descr="Image result for keras machine learning">
+          <p:cNvPr id="1028" name="Picture 4" descr="https://www.saama.com/wp-content/uploads/2017/12/05.jpg">
             <a:extLst>
               <a:ext uri="{FF2B5EF4-FFF2-40B4-BE49-F238E27FC236}">
-                <a16:creationId xmlns:a16="http://schemas.microsoft.com/office/drawing/2014/main" id="{0C6AEC16-F87A-4600-A998-BA0915F6D6F1}"/>
+                <a16:creationId xmlns:a16="http://schemas.microsoft.com/office/drawing/2014/main" id="{A40789D3-74B4-4119-8754-658207C6E34A}"/>
               </a:ext>
             </a:extLst>
           </p:cNvPr>
@@ -13187,8 +13817,8 @@
         </p:blipFill>
         <p:spPr bwMode="auto">
           <a:xfrm>
-            <a:off x="8193098" y="3526971"/>
-            <a:ext cx="2721427" cy="2721427"/>
+            <a:off x="6980416" y="3540651"/>
+            <a:ext cx="3690070" cy="2721427"/>
           </a:xfrm>
           <a:prstGeom prst="rect">
             <a:avLst/>
@@ -13209,7 +13839,764 @@
     </p:spTree>
     <p:extLst>
       <p:ext uri="{BB962C8B-B14F-4D97-AF65-F5344CB8AC3E}">
-        <p14:creationId xmlns:p14="http://schemas.microsoft.com/office/powerpoint/2010/main" val="2042469434"/>
+        <p14:creationId xmlns:p14="http://schemas.microsoft.com/office/powerpoint/2010/main" val="3312726128"/>
+      </p:ext>
+    </p:extLst>
+  </p:cSld>
+  <p:clrMapOvr>
+    <a:masterClrMapping/>
+  </p:clrMapOvr>
+</p:sld>
+</file>
+
+<file path=ppt/slides/slide7.xml><?xml version="1.0" encoding="utf-8"?>
+<p:sld xmlns:a="http://schemas.openxmlformats.org/drawingml/2006/main" xmlns:r="http://schemas.openxmlformats.org/officeDocument/2006/relationships" xmlns:p="http://schemas.openxmlformats.org/presentationml/2006/main">
+  <p:cSld>
+    <p:bg>
+      <p:bgPr>
+        <a:blipFill rotWithShape="1">
+          <a:blip r:embed="rId2">
+            <a:duotone>
+              <a:schemeClr val="bg2">
+                <a:shade val="62000"/>
+                <a:hueMod val="108000"/>
+                <a:satMod val="164000"/>
+                <a:lumMod val="69000"/>
+              </a:schemeClr>
+              <a:schemeClr val="bg2">
+                <a:tint val="96000"/>
+                <a:hueMod val="90000"/>
+                <a:satMod val="130000"/>
+                <a:lumMod val="134000"/>
+              </a:schemeClr>
+            </a:duotone>
+            <a:extLst/>
+          </a:blip>
+          <a:stretch/>
+        </a:blipFill>
+        <a:effectLst/>
+      </p:bgPr>
+    </p:bg>
+    <p:spTree>
+      <p:nvGrpSpPr>
+        <p:cNvPr id="1" name=""/>
+        <p:cNvGrpSpPr/>
+        <p:nvPr/>
+      </p:nvGrpSpPr>
+      <p:grpSpPr>
+        <a:xfrm>
+          <a:off x="0" y="0"/>
+          <a:ext cx="0" cy="0"/>
+          <a:chOff x="0" y="0"/>
+          <a:chExt cx="0" cy="0"/>
+        </a:xfrm>
+      </p:grpSpPr>
+      <p:sp>
+        <p:nvSpPr>
+          <p:cNvPr id="2" name="Title 1">
+            <a:extLst>
+              <a:ext uri="{FF2B5EF4-FFF2-40B4-BE49-F238E27FC236}">
+                <a16:creationId xmlns:a16="http://schemas.microsoft.com/office/drawing/2014/main" id="{40477105-562F-4C08-8B00-FE30C74F9C48}"/>
+              </a:ext>
+            </a:extLst>
+          </p:cNvPr>
+          <p:cNvSpPr>
+            <a:spLocks noGrp="1"/>
+          </p:cNvSpPr>
+          <p:nvPr>
+            <p:ph type="title"/>
+          </p:nvPr>
+        </p:nvSpPr>
+        <p:spPr>
+          <a:xfrm>
+            <a:off x="648929" y="629266"/>
+            <a:ext cx="4944152" cy="1622321"/>
+          </a:xfrm>
+        </p:spPr>
+        <p:txBody>
+          <a:bodyPr>
+            <a:normAutofit/>
+          </a:bodyPr>
+          <a:lstStyle/>
+          <a:p>
+            <a:r>
+              <a:rPr lang="en-US" dirty="0"/>
+              <a:t>Some terms</a:t>
+            </a:r>
+          </a:p>
+        </p:txBody>
+      </p:sp>
+      <p:sp>
+        <p:nvSpPr>
+          <p:cNvPr id="3" name="Content Placeholder 2">
+            <a:extLst>
+              <a:ext uri="{FF2B5EF4-FFF2-40B4-BE49-F238E27FC236}">
+                <a16:creationId xmlns:a16="http://schemas.microsoft.com/office/drawing/2014/main" id="{0E242E71-7630-4A8D-864E-FAE156FD99E8}"/>
+              </a:ext>
+            </a:extLst>
+          </p:cNvPr>
+          <p:cNvSpPr>
+            <a:spLocks noGrp="1"/>
+          </p:cNvSpPr>
+          <p:nvPr>
+            <p:ph idx="1"/>
+          </p:nvPr>
+        </p:nvSpPr>
+        <p:spPr>
+          <a:xfrm>
+            <a:off x="648930" y="2438400"/>
+            <a:ext cx="4944151" cy="3785419"/>
+          </a:xfrm>
+        </p:spPr>
+        <p:txBody>
+          <a:bodyPr>
+            <a:normAutofit/>
+          </a:bodyPr>
+          <a:lstStyle/>
+          <a:p>
+            <a:r>
+              <a:rPr lang="en-US" dirty="0"/>
+              <a:t>Stride is the size of the step. A larger stride leads to fewer steps, which means a smaller activation map. (less time to compute!!)</a:t>
+            </a:r>
+          </a:p>
+          <a:p>
+            <a:endParaRPr lang="en-US" dirty="0"/>
+          </a:p>
+          <a:p>
+            <a:r>
+              <a:rPr lang="en-US" dirty="0"/>
+              <a:t>Padding is adding 0’s around the layers. This allows us to preserve as much information about the original input volume</a:t>
+            </a:r>
+          </a:p>
+        </p:txBody>
+      </p:sp>
+      <p:sp>
+        <p:nvSpPr>
+          <p:cNvPr id="10" name="Rectangle 9">
+            <a:extLst>
+              <a:ext uri="{FF2B5EF4-FFF2-40B4-BE49-F238E27FC236}">
+                <a16:creationId xmlns:a16="http://schemas.microsoft.com/office/drawing/2014/main" id="{B1C2DFB7-5186-4D49-B5A6-99BDF443A48D}"/>
+              </a:ext>
+              <a:ext uri="{C183D7F6-B498-43B3-948B-1728B52AA6E4}">
+                <adec:decorative xmlns:adec="http://schemas.microsoft.com/office/drawing/2017/decorative" val="1"/>
+              </a:ext>
+            </a:extLst>
+          </p:cNvPr>
+          <p:cNvSpPr>
+            <a:spLocks noGrp="1" noRot="1" noChangeAspect="1" noMove="1" noResize="1" noEditPoints="1" noAdjustHandles="1" noChangeArrowheads="1" noChangeShapeType="1" noTextEdit="1"/>
+          </p:cNvSpPr>
+          <p:nvPr>
+            <p:extLst>
+              <p:ext uri="{386F3935-93C4-4BCD-93E2-E3B085C9AB24}">
+                <p16:designElem xmlns:p16="http://schemas.microsoft.com/office/powerpoint/2015/main" val="1"/>
+              </p:ext>
+            </p:extLst>
+          </p:nvPr>
+        </p:nvSpPr>
+        <p:spPr>
+          <a:xfrm>
+            <a:off x="6092950" y="0"/>
+            <a:ext cx="6099050" cy="6858000"/>
+          </a:xfrm>
+          <a:prstGeom prst="rect">
+            <a:avLst/>
+          </a:prstGeom>
+          <a:solidFill>
+            <a:srgbClr val="FFFFFF"/>
+          </a:solidFill>
+          <a:ln>
+            <a:noFill/>
+          </a:ln>
+        </p:spPr>
+        <p:style>
+          <a:lnRef idx="2">
+            <a:schemeClr val="accent1">
+              <a:shade val="50000"/>
+            </a:schemeClr>
+          </a:lnRef>
+          <a:fillRef idx="1">
+            <a:schemeClr val="accent1"/>
+          </a:fillRef>
+          <a:effectRef idx="0">
+            <a:schemeClr val="accent1"/>
+          </a:effectRef>
+          <a:fontRef idx="minor">
+            <a:schemeClr val="lt1"/>
+          </a:fontRef>
+        </p:style>
+        <p:txBody>
+          <a:bodyPr rtlCol="0" anchor="ctr"/>
+          <a:lstStyle/>
+          <a:p>
+            <a:pPr algn="ctr"/>
+            <a:endParaRPr lang="en-US"/>
+          </a:p>
+        </p:txBody>
+      </p:sp>
+      <p:sp>
+        <p:nvSpPr>
+          <p:cNvPr id="12" name="Rounded Rectangle 9">
+            <a:extLst>
+              <a:ext uri="{FF2B5EF4-FFF2-40B4-BE49-F238E27FC236}">
+                <a16:creationId xmlns:a16="http://schemas.microsoft.com/office/drawing/2014/main" id="{8E46F046-D267-4952-A9CF-D2E73187A6A4}"/>
+              </a:ext>
+              <a:ext uri="{C183D7F6-B498-43B3-948B-1728B52AA6E4}">
+                <adec:decorative xmlns:adec="http://schemas.microsoft.com/office/drawing/2017/decorative" val="1"/>
+              </a:ext>
+            </a:extLst>
+          </p:cNvPr>
+          <p:cNvSpPr>
+            <a:spLocks noGrp="1" noRot="1" noChangeAspect="1" noMove="1" noResize="1" noEditPoints="1" noAdjustHandles="1" noChangeArrowheads="1" noChangeShapeType="1" noTextEdit="1"/>
+          </p:cNvSpPr>
+          <p:nvPr>
+            <p:extLst>
+              <p:ext uri="{386F3935-93C4-4BCD-93E2-E3B085C9AB24}">
+                <p16:designElem xmlns:p16="http://schemas.microsoft.com/office/powerpoint/2015/main" val="1"/>
+              </p:ext>
+            </p:extLst>
+          </p:nvPr>
+        </p:nvSpPr>
+        <p:spPr>
+          <a:xfrm>
+            <a:off x="6577582" y="484632"/>
+            <a:ext cx="5130204" cy="5739187"/>
+          </a:xfrm>
+          <a:prstGeom prst="roundRect">
+            <a:avLst>
+              <a:gd name="adj" fmla="val 0"/>
+            </a:avLst>
+          </a:prstGeom>
+          <a:solidFill>
+            <a:schemeClr val="tx1"/>
+          </a:solidFill>
+          <a:ln w="12700">
+            <a:solidFill>
+              <a:schemeClr val="tx2">
+                <a:lumMod val="75000"/>
+              </a:schemeClr>
+            </a:solidFill>
+          </a:ln>
+          <a:effectLst>
+            <a:outerShdw blurRad="50800" dist="50800" dir="5400000" algn="tl" rotWithShape="0">
+              <a:srgbClr val="000000">
+                <a:alpha val="43000"/>
+              </a:srgbClr>
+            </a:outerShdw>
+          </a:effectLst>
+        </p:spPr>
+        <p:style>
+          <a:lnRef idx="2">
+            <a:schemeClr val="accent1">
+              <a:shade val="50000"/>
+            </a:schemeClr>
+          </a:lnRef>
+          <a:fillRef idx="1">
+            <a:schemeClr val="accent1"/>
+          </a:fillRef>
+          <a:effectRef idx="0">
+            <a:schemeClr val="accent1"/>
+          </a:effectRef>
+          <a:fontRef idx="minor">
+            <a:schemeClr val="lt1"/>
+          </a:fontRef>
+        </p:style>
+        <p:txBody>
+          <a:bodyPr rtlCol="0" anchor="ctr"/>
+          <a:lstStyle/>
+          <a:p>
+            <a:pPr algn="ctr"/>
+            <a:endParaRPr lang="en-US"/>
+          </a:p>
+        </p:txBody>
+      </p:sp>
+      <p:pic>
+        <p:nvPicPr>
+          <p:cNvPr id="5" name="Picture 2" descr="https://cdn-images-1.medium.com/max/1000/1*ZCjPUFrB6eHPRi4eyP6aaA.gif">
+            <a:extLst>
+              <a:ext uri="{FF2B5EF4-FFF2-40B4-BE49-F238E27FC236}">
+                <a16:creationId xmlns:a16="http://schemas.microsoft.com/office/drawing/2014/main" id="{D515A69A-D594-4869-9F95-F42F319ADB6C}"/>
+              </a:ext>
+            </a:extLst>
+          </p:cNvPr>
+          <p:cNvPicPr>
+            <a:picLocks noChangeAspect="1" noChangeArrowheads="1" noCrop="1"/>
+          </p:cNvPicPr>
+          <p:nvPr/>
+        </p:nvPicPr>
+        <p:blipFill>
+          <a:blip r:embed="rId3">
+            <a:extLst>
+              <a:ext uri="{28A0092B-C50C-407E-A947-70E740481C1C}">
+                <a14:useLocalDpi xmlns:a14="http://schemas.microsoft.com/office/drawing/2010/main" val="0"/>
+              </a:ext>
+            </a:extLst>
+          </a:blip>
+          <a:srcRect/>
+          <a:stretch>
+            <a:fillRect/>
+          </a:stretch>
+        </p:blipFill>
+        <p:spPr bwMode="auto">
+          <a:xfrm>
+            <a:off x="7060689" y="1834290"/>
+            <a:ext cx="4163991" cy="3039871"/>
+          </a:xfrm>
+          <a:prstGeom prst="rect">
+            <a:avLst/>
+          </a:prstGeom>
+          <a:noFill/>
+          <a:effectLst/>
+          <a:extLst>
+            <a:ext uri="{909E8E84-426E-40DD-AFC4-6F175D3DCCD1}">
+              <a14:hiddenFill xmlns:a14="http://schemas.microsoft.com/office/drawing/2010/main">
+                <a:solidFill>
+                  <a:srgbClr val="FFFFFF"/>
+                </a:solidFill>
+              </a14:hiddenFill>
+            </a:ext>
+          </a:extLst>
+        </p:spPr>
+      </p:pic>
+      <p:sp>
+        <p:nvSpPr>
+          <p:cNvPr id="14" name="Rectangle 13">
+            <a:extLst>
+              <a:ext uri="{FF2B5EF4-FFF2-40B4-BE49-F238E27FC236}">
+                <a16:creationId xmlns:a16="http://schemas.microsoft.com/office/drawing/2014/main" id="{B0BCBBE0-549F-4678-BF52-43A69367C983}"/>
+              </a:ext>
+              <a:ext uri="{C183D7F6-B498-43B3-948B-1728B52AA6E4}">
+                <adec:decorative xmlns:adec="http://schemas.microsoft.com/office/drawing/2017/decorative" val="1"/>
+              </a:ext>
+            </a:extLst>
+          </p:cNvPr>
+          <p:cNvSpPr>
+            <a:spLocks noGrp="1" noRot="1" noChangeAspect="1" noMove="1" noResize="1" noEditPoints="1" noAdjustHandles="1" noChangeArrowheads="1" noChangeShapeType="1" noTextEdit="1"/>
+          </p:cNvSpPr>
+          <p:nvPr>
+            <p:extLst>
+              <p:ext uri="{386F3935-93C4-4BCD-93E2-E3B085C9AB24}">
+                <p16:designElem xmlns:p16="http://schemas.microsoft.com/office/powerpoint/2015/main" val="1"/>
+              </p:ext>
+            </p:extLst>
+          </p:nvPr>
+        </p:nvSpPr>
+        <p:spPr>
+          <a:xfrm>
+            <a:off x="10442448" y="0"/>
+            <a:ext cx="685800" cy="1143000"/>
+          </a:xfrm>
+          <a:prstGeom prst="rect">
+            <a:avLst/>
+          </a:prstGeom>
+          <a:solidFill>
+            <a:schemeClr val="accent1"/>
+          </a:solidFill>
+          <a:ln>
+            <a:noFill/>
+          </a:ln>
+        </p:spPr>
+        <p:style>
+          <a:lnRef idx="1">
+            <a:schemeClr val="accent1"/>
+          </a:lnRef>
+          <a:fillRef idx="3">
+            <a:schemeClr val="accent1"/>
+          </a:fillRef>
+          <a:effectRef idx="2">
+            <a:schemeClr val="accent1"/>
+          </a:effectRef>
+          <a:fontRef idx="minor">
+            <a:schemeClr val="lt1"/>
+          </a:fontRef>
+        </p:style>
+      </p:sp>
+    </p:spTree>
+    <p:extLst>
+      <p:ext uri="{BB962C8B-B14F-4D97-AF65-F5344CB8AC3E}">
+        <p14:creationId xmlns:p14="http://schemas.microsoft.com/office/powerpoint/2010/main" val="1486300628"/>
+      </p:ext>
+    </p:extLst>
+  </p:cSld>
+  <p:clrMapOvr>
+    <a:masterClrMapping/>
+  </p:clrMapOvr>
+</p:sld>
+</file>
+
+<file path=ppt/slides/slide8.xml><?xml version="1.0" encoding="utf-8"?>
+<p:sld xmlns:a="http://schemas.openxmlformats.org/drawingml/2006/main" xmlns:r="http://schemas.openxmlformats.org/officeDocument/2006/relationships" xmlns:p="http://schemas.openxmlformats.org/presentationml/2006/main">
+  <p:cSld>
+    <p:bg>
+      <p:bgPr>
+        <a:blipFill rotWithShape="1">
+          <a:blip r:embed="rId2">
+            <a:duotone>
+              <a:schemeClr val="bg2">
+                <a:shade val="62000"/>
+                <a:hueMod val="108000"/>
+                <a:satMod val="164000"/>
+                <a:lumMod val="69000"/>
+              </a:schemeClr>
+              <a:schemeClr val="bg2">
+                <a:tint val="96000"/>
+                <a:hueMod val="90000"/>
+                <a:satMod val="130000"/>
+                <a:lumMod val="134000"/>
+              </a:schemeClr>
+            </a:duotone>
+            <a:extLst/>
+          </a:blip>
+          <a:stretch/>
+        </a:blipFill>
+        <a:effectLst/>
+      </p:bgPr>
+    </p:bg>
+    <p:spTree>
+      <p:nvGrpSpPr>
+        <p:cNvPr id="1" name=""/>
+        <p:cNvGrpSpPr/>
+        <p:nvPr/>
+      </p:nvGrpSpPr>
+      <p:grpSpPr>
+        <a:xfrm>
+          <a:off x="0" y="0"/>
+          <a:ext cx="0" cy="0"/>
+          <a:chOff x="0" y="0"/>
+          <a:chExt cx="0" cy="0"/>
+        </a:xfrm>
+      </p:grpSpPr>
+      <p:sp>
+        <p:nvSpPr>
+          <p:cNvPr id="2" name="Title 1">
+            <a:extLst>
+              <a:ext uri="{FF2B5EF4-FFF2-40B4-BE49-F238E27FC236}">
+                <a16:creationId xmlns:a16="http://schemas.microsoft.com/office/drawing/2014/main" id="{B7803FDF-1BD7-4C93-B725-D99252974604}"/>
+              </a:ext>
+            </a:extLst>
+          </p:cNvPr>
+          <p:cNvSpPr>
+            <a:spLocks noGrp="1"/>
+          </p:cNvSpPr>
+          <p:nvPr>
+            <p:ph type="title"/>
+          </p:nvPr>
+        </p:nvSpPr>
+        <p:spPr>
+          <a:xfrm>
+            <a:off x="648929" y="629266"/>
+            <a:ext cx="4944152" cy="1622321"/>
+          </a:xfrm>
+        </p:spPr>
+        <p:txBody>
+          <a:bodyPr>
+            <a:normAutofit/>
+          </a:bodyPr>
+          <a:lstStyle/>
+          <a:p>
+            <a:r>
+              <a:rPr lang="en-US" dirty="0"/>
+              <a:t>Max Pooling with CNN’s</a:t>
+            </a:r>
+          </a:p>
+        </p:txBody>
+      </p:sp>
+      <p:sp>
+        <p:nvSpPr>
+          <p:cNvPr id="3" name="Content Placeholder 2">
+            <a:extLst>
+              <a:ext uri="{FF2B5EF4-FFF2-40B4-BE49-F238E27FC236}">
+                <a16:creationId xmlns:a16="http://schemas.microsoft.com/office/drawing/2014/main" id="{6D66A8C2-C0C3-4FD5-B0FE-3BD80AF9489F}"/>
+              </a:ext>
+            </a:extLst>
+          </p:cNvPr>
+          <p:cNvSpPr>
+            <a:spLocks noGrp="1"/>
+          </p:cNvSpPr>
+          <p:nvPr>
+            <p:ph idx="1"/>
+          </p:nvPr>
+        </p:nvSpPr>
+        <p:spPr>
+          <a:xfrm>
+            <a:off x="648930" y="2438400"/>
+            <a:ext cx="4944151" cy="3785419"/>
+          </a:xfrm>
+        </p:spPr>
+        <p:txBody>
+          <a:bodyPr>
+            <a:normAutofit/>
+          </a:bodyPr>
+          <a:lstStyle/>
+          <a:p>
+            <a:r>
+              <a:rPr lang="en-US" dirty="0"/>
+              <a:t>A layer in a convolutional network</a:t>
+            </a:r>
+          </a:p>
+          <a:p>
+            <a:r>
+              <a:rPr lang="en-US" dirty="0"/>
+              <a:t>Takes the output layers and applies down sampling</a:t>
+            </a:r>
+          </a:p>
+          <a:p>
+            <a:r>
+              <a:rPr lang="en-US" dirty="0"/>
+              <a:t>In this example, only the locations on the image that showed the strongest correlation to each feature are preserved</a:t>
+            </a:r>
+          </a:p>
+          <a:p>
+            <a:r>
+              <a:rPr lang="en-US" dirty="0"/>
+              <a:t>Allows lesser values to be lost, decreasing the amount of storage and processing</a:t>
+            </a:r>
+          </a:p>
+        </p:txBody>
+      </p:sp>
+      <p:sp>
+        <p:nvSpPr>
+          <p:cNvPr id="135" name="Rectangle 134">
+            <a:extLst>
+              <a:ext uri="{FF2B5EF4-FFF2-40B4-BE49-F238E27FC236}">
+                <a16:creationId xmlns:a16="http://schemas.microsoft.com/office/drawing/2014/main" id="{B1C2DFB7-5186-4D49-B5A6-99BDF443A48D}"/>
+              </a:ext>
+              <a:ext uri="{C183D7F6-B498-43B3-948B-1728B52AA6E4}">
+                <adec:decorative xmlns:adec="http://schemas.microsoft.com/office/drawing/2017/decorative" val="1"/>
+              </a:ext>
+            </a:extLst>
+          </p:cNvPr>
+          <p:cNvSpPr>
+            <a:spLocks noGrp="1" noRot="1" noChangeAspect="1" noMove="1" noResize="1" noEditPoints="1" noAdjustHandles="1" noChangeArrowheads="1" noChangeShapeType="1" noTextEdit="1"/>
+          </p:cNvSpPr>
+          <p:nvPr>
+            <p:extLst>
+              <p:ext uri="{386F3935-93C4-4BCD-93E2-E3B085C9AB24}">
+                <p16:designElem xmlns:p16="http://schemas.microsoft.com/office/powerpoint/2015/main" val="1"/>
+              </p:ext>
+            </p:extLst>
+          </p:nvPr>
+        </p:nvSpPr>
+        <p:spPr>
+          <a:xfrm>
+            <a:off x="6092950" y="0"/>
+            <a:ext cx="6099050" cy="6858000"/>
+          </a:xfrm>
+          <a:prstGeom prst="rect">
+            <a:avLst/>
+          </a:prstGeom>
+          <a:solidFill>
+            <a:srgbClr val="FFFFFF"/>
+          </a:solidFill>
+          <a:ln>
+            <a:noFill/>
+          </a:ln>
+        </p:spPr>
+        <p:style>
+          <a:lnRef idx="2">
+            <a:schemeClr val="accent1">
+              <a:shade val="50000"/>
+            </a:schemeClr>
+          </a:lnRef>
+          <a:fillRef idx="1">
+            <a:schemeClr val="accent1"/>
+          </a:fillRef>
+          <a:effectRef idx="0">
+            <a:schemeClr val="accent1"/>
+          </a:effectRef>
+          <a:fontRef idx="minor">
+            <a:schemeClr val="lt1"/>
+          </a:fontRef>
+        </p:style>
+        <p:txBody>
+          <a:bodyPr rtlCol="0" anchor="ctr"/>
+          <a:lstStyle/>
+          <a:p>
+            <a:pPr algn="ctr"/>
+            <a:endParaRPr lang="en-US"/>
+          </a:p>
+        </p:txBody>
+      </p:sp>
+      <p:sp>
+        <p:nvSpPr>
+          <p:cNvPr id="137" name="Rounded Rectangle 9">
+            <a:extLst>
+              <a:ext uri="{FF2B5EF4-FFF2-40B4-BE49-F238E27FC236}">
+                <a16:creationId xmlns:a16="http://schemas.microsoft.com/office/drawing/2014/main" id="{8E46F046-D267-4952-A9CF-D2E73187A6A4}"/>
+              </a:ext>
+              <a:ext uri="{C183D7F6-B498-43B3-948B-1728B52AA6E4}">
+                <adec:decorative xmlns:adec="http://schemas.microsoft.com/office/drawing/2017/decorative" val="1"/>
+              </a:ext>
+            </a:extLst>
+          </p:cNvPr>
+          <p:cNvSpPr>
+            <a:spLocks noGrp="1" noRot="1" noChangeAspect="1" noMove="1" noResize="1" noEditPoints="1" noAdjustHandles="1" noChangeArrowheads="1" noChangeShapeType="1" noTextEdit="1"/>
+          </p:cNvSpPr>
+          <p:nvPr>
+            <p:extLst>
+              <p:ext uri="{386F3935-93C4-4BCD-93E2-E3B085C9AB24}">
+                <p16:designElem xmlns:p16="http://schemas.microsoft.com/office/powerpoint/2015/main" val="1"/>
+              </p:ext>
+            </p:extLst>
+          </p:nvPr>
+        </p:nvSpPr>
+        <p:spPr>
+          <a:xfrm>
+            <a:off x="6577582" y="484632"/>
+            <a:ext cx="5130204" cy="5739187"/>
+          </a:xfrm>
+          <a:prstGeom prst="roundRect">
+            <a:avLst>
+              <a:gd name="adj" fmla="val 0"/>
+            </a:avLst>
+          </a:prstGeom>
+          <a:solidFill>
+            <a:schemeClr val="tx1"/>
+          </a:solidFill>
+          <a:ln w="12700">
+            <a:solidFill>
+              <a:schemeClr val="tx2">
+                <a:lumMod val="75000"/>
+              </a:schemeClr>
+            </a:solidFill>
+          </a:ln>
+          <a:effectLst>
+            <a:outerShdw blurRad="50800" dist="50800" dir="5400000" algn="tl" rotWithShape="0">
+              <a:srgbClr val="000000">
+                <a:alpha val="43000"/>
+              </a:srgbClr>
+            </a:outerShdw>
+          </a:effectLst>
+        </p:spPr>
+        <p:style>
+          <a:lnRef idx="2">
+            <a:schemeClr val="accent1">
+              <a:shade val="50000"/>
+            </a:schemeClr>
+          </a:lnRef>
+          <a:fillRef idx="1">
+            <a:schemeClr val="accent1"/>
+          </a:fillRef>
+          <a:effectRef idx="0">
+            <a:schemeClr val="accent1"/>
+          </a:effectRef>
+          <a:fontRef idx="minor">
+            <a:schemeClr val="lt1"/>
+          </a:fontRef>
+        </p:style>
+        <p:txBody>
+          <a:bodyPr rtlCol="0" anchor="ctr"/>
+          <a:lstStyle/>
+          <a:p>
+            <a:pPr algn="ctr"/>
+            <a:endParaRPr lang="en-US"/>
+          </a:p>
+        </p:txBody>
+      </p:sp>
+      <p:pic>
+        <p:nvPicPr>
+          <p:cNvPr id="3074" name="Picture 2" descr="max pooling">
+            <a:extLst>
+              <a:ext uri="{FF2B5EF4-FFF2-40B4-BE49-F238E27FC236}">
+                <a16:creationId xmlns:a16="http://schemas.microsoft.com/office/drawing/2014/main" id="{B963B401-A483-4BCB-B368-3688C3523C9C}"/>
+              </a:ext>
+            </a:extLst>
+          </p:cNvPr>
+          <p:cNvPicPr>
+            <a:picLocks noChangeAspect="1" noChangeArrowheads="1"/>
+          </p:cNvPicPr>
+          <p:nvPr/>
+        </p:nvPicPr>
+        <p:blipFill>
+          <a:blip r:embed="rId3">
+            <a:extLst>
+              <a:ext uri="{28A0092B-C50C-407E-A947-70E740481C1C}">
+                <a14:useLocalDpi xmlns:a14="http://schemas.microsoft.com/office/drawing/2010/main" val="0"/>
+              </a:ext>
+            </a:extLst>
+          </a:blip>
+          <a:srcRect/>
+          <a:stretch>
+            <a:fillRect/>
+          </a:stretch>
+        </p:blipFill>
+        <p:spPr bwMode="auto">
+          <a:xfrm>
+            <a:off x="7060689" y="2349663"/>
+            <a:ext cx="4163991" cy="2009125"/>
+          </a:xfrm>
+          <a:prstGeom prst="rect">
+            <a:avLst/>
+          </a:prstGeom>
+          <a:noFill/>
+          <a:effectLst/>
+          <a:extLst>
+            <a:ext uri="{909E8E84-426E-40DD-AFC4-6F175D3DCCD1}">
+              <a14:hiddenFill xmlns:a14="http://schemas.microsoft.com/office/drawing/2010/main">
+                <a:solidFill>
+                  <a:srgbClr val="FFFFFF"/>
+                </a:solidFill>
+              </a14:hiddenFill>
+            </a:ext>
+          </a:extLst>
+        </p:spPr>
+      </p:pic>
+      <p:sp>
+        <p:nvSpPr>
+          <p:cNvPr id="139" name="Rectangle 138">
+            <a:extLst>
+              <a:ext uri="{FF2B5EF4-FFF2-40B4-BE49-F238E27FC236}">
+                <a16:creationId xmlns:a16="http://schemas.microsoft.com/office/drawing/2014/main" id="{B0BCBBE0-549F-4678-BF52-43A69367C983}"/>
+              </a:ext>
+              <a:ext uri="{C183D7F6-B498-43B3-948B-1728B52AA6E4}">
+                <adec:decorative xmlns:adec="http://schemas.microsoft.com/office/drawing/2017/decorative" val="1"/>
+              </a:ext>
+            </a:extLst>
+          </p:cNvPr>
+          <p:cNvSpPr>
+            <a:spLocks noGrp="1" noRot="1" noChangeAspect="1" noMove="1" noResize="1" noEditPoints="1" noAdjustHandles="1" noChangeArrowheads="1" noChangeShapeType="1" noTextEdit="1"/>
+          </p:cNvSpPr>
+          <p:nvPr>
+            <p:extLst>
+              <p:ext uri="{386F3935-93C4-4BCD-93E2-E3B085C9AB24}">
+                <p16:designElem xmlns:p16="http://schemas.microsoft.com/office/powerpoint/2015/main" val="1"/>
+              </p:ext>
+            </p:extLst>
+          </p:nvPr>
+        </p:nvSpPr>
+        <p:spPr>
+          <a:xfrm>
+            <a:off x="10442448" y="0"/>
+            <a:ext cx="685800" cy="1143000"/>
+          </a:xfrm>
+          <a:prstGeom prst="rect">
+            <a:avLst/>
+          </a:prstGeom>
+          <a:solidFill>
+            <a:schemeClr val="accent1"/>
+          </a:solidFill>
+          <a:ln>
+            <a:noFill/>
+          </a:ln>
+        </p:spPr>
+        <p:style>
+          <a:lnRef idx="1">
+            <a:schemeClr val="accent1"/>
+          </a:lnRef>
+          <a:fillRef idx="3">
+            <a:schemeClr val="accent1"/>
+          </a:fillRef>
+          <a:effectRef idx="2">
+            <a:schemeClr val="accent1"/>
+          </a:effectRef>
+          <a:fontRef idx="minor">
+            <a:schemeClr val="lt1"/>
+          </a:fontRef>
+        </p:style>
+      </p:sp>
+    </p:spTree>
+    <p:extLst>
+      <p:ext uri="{BB962C8B-B14F-4D97-AF65-F5344CB8AC3E}">
+        <p14:creationId xmlns:p14="http://schemas.microsoft.com/office/powerpoint/2010/main" val="1423749011"/>
       </p:ext>
     </p:extLst>
   </p:cSld>
@@ -13241,7 +14628,7 @@
           <p:cNvPr id="2" name="Title 1">
             <a:extLst>
               <a:ext uri="{FF2B5EF4-FFF2-40B4-BE49-F238E27FC236}">
-                <a16:creationId xmlns:a16="http://schemas.microsoft.com/office/drawing/2014/main" id="{EDA23C2B-8911-442D-92B9-6BE80718B0A8}"/>
+                <a16:creationId xmlns:a16="http://schemas.microsoft.com/office/drawing/2014/main" id="{F5D176DD-879B-4894-A871-774B6333B95F}"/>
               </a:ext>
             </a:extLst>
           </p:cNvPr>
@@ -13252,74 +14639,415 @@
             <p:ph type="title"/>
           </p:nvPr>
         </p:nvSpPr>
-        <p:spPr>
-          <a:xfrm>
-            <a:off x="646111" y="452718"/>
-            <a:ext cx="9404723" cy="1400530"/>
-          </a:xfrm>
-        </p:spPr>
+        <p:spPr/>
         <p:txBody>
           <a:bodyPr/>
           <a:lstStyle/>
           <a:p>
             <a:r>
               <a:rPr lang="en-US" dirty="0"/>
-              <a:t>The Simpsons CNN!</a:t>
+              <a:t>Example of pooling</a:t>
             </a:r>
           </a:p>
         </p:txBody>
       </p:sp>
       <p:pic>
         <p:nvPicPr>
-          <p:cNvPr id="7172" name="Picture 4" descr="Image result for the simpsons">
+          <p:cNvPr id="4" name="Content Placeholder 3">
             <a:extLst>
               <a:ext uri="{FF2B5EF4-FFF2-40B4-BE49-F238E27FC236}">
-                <a16:creationId xmlns:a16="http://schemas.microsoft.com/office/drawing/2014/main" id="{0BF1BC16-A8C1-41FA-A920-EAA352566F9B}"/>
+                <a16:creationId xmlns:a16="http://schemas.microsoft.com/office/drawing/2014/main" id="{E5290CBB-3782-4648-8FFA-0A2E88D421C3}"/>
               </a:ext>
             </a:extLst>
           </p:cNvPr>
           <p:cNvPicPr>
-            <a:picLocks noChangeAspect="1" noChangeArrowheads="1"/>
+            <a:picLocks noGrp="1" noChangeAspect="1"/>
           </p:cNvPicPr>
-          <p:nvPr/>
+          <p:nvPr>
+            <p:ph idx="1"/>
+          </p:nvPr>
         </p:nvPicPr>
         <p:blipFill>
-          <a:blip r:embed="rId2">
-            <a:extLst>
-              <a:ext uri="{28A0092B-C50C-407E-A947-70E740481C1C}">
-                <a14:useLocalDpi xmlns:a14="http://schemas.microsoft.com/office/drawing/2010/main" val="0"/>
-              </a:ext>
-            </a:extLst>
-          </a:blip>
-          <a:srcRect/>
+          <a:blip r:embed="rId2"/>
           <a:stretch>
             <a:fillRect/>
           </a:stretch>
         </p:blipFill>
-        <p:spPr bwMode="auto">
+        <p:spPr>
           <a:xfrm>
-            <a:off x="1778925" y="2078177"/>
-            <a:ext cx="8489393" cy="3697922"/>
+            <a:off x="547367" y="2503868"/>
+            <a:ext cx="3136464" cy="3151839"/>
+          </a:xfrm>
+          <a:prstGeom prst="rect">
+            <a:avLst/>
+          </a:prstGeom>
+        </p:spPr>
+      </p:pic>
+      <p:sp>
+        <p:nvSpPr>
+          <p:cNvPr id="5" name="TextBox 4">
+            <a:extLst>
+              <a:ext uri="{FF2B5EF4-FFF2-40B4-BE49-F238E27FC236}">
+                <a16:creationId xmlns:a16="http://schemas.microsoft.com/office/drawing/2014/main" id="{F66F9831-CCBE-47E4-841C-42D3705E8B1D}"/>
+              </a:ext>
+            </a:extLst>
+          </p:cNvPr>
+          <p:cNvSpPr txBox="1"/>
+          <p:nvPr/>
+        </p:nvSpPr>
+        <p:spPr>
+          <a:xfrm>
+            <a:off x="1342791" y="5849922"/>
+            <a:ext cx="1545616" cy="369332"/>
           </a:xfrm>
           <a:prstGeom prst="rect">
             <a:avLst/>
           </a:prstGeom>
           <a:noFill/>
-          <a:extLst>
-            <a:ext uri="{909E8E84-426E-40DD-AFC4-6F175D3DCCD1}">
-              <a14:hiddenFill xmlns:a14="http://schemas.microsoft.com/office/drawing/2010/main">
-                <a:solidFill>
-                  <a:srgbClr val="FFFFFF"/>
-                </a:solidFill>
-              </a14:hiddenFill>
-            </a:ext>
-          </a:extLst>
+        </p:spPr>
+        <p:txBody>
+          <a:bodyPr wrap="none" rtlCol="0">
+            <a:spAutoFit/>
+          </a:bodyPr>
+          <a:lstStyle/>
+          <a:p>
+            <a:r>
+              <a:rPr lang="en-US" dirty="0"/>
+              <a:t>Input Image</a:t>
+            </a:r>
+          </a:p>
+        </p:txBody>
+      </p:sp>
+      <p:pic>
+        <p:nvPicPr>
+          <p:cNvPr id="6" name="Picture 5">
+            <a:extLst>
+              <a:ext uri="{FF2B5EF4-FFF2-40B4-BE49-F238E27FC236}">
+                <a16:creationId xmlns:a16="http://schemas.microsoft.com/office/drawing/2014/main" id="{47BF116B-5583-455A-B24A-EDE95FD25640}"/>
+              </a:ext>
+            </a:extLst>
+          </p:cNvPr>
+          <p:cNvPicPr>
+            <a:picLocks noChangeAspect="1"/>
+          </p:cNvPicPr>
+          <p:nvPr/>
+        </p:nvPicPr>
+        <p:blipFill>
+          <a:blip r:embed="rId3"/>
+          <a:stretch>
+            <a:fillRect/>
+          </a:stretch>
+        </p:blipFill>
+        <p:spPr>
+          <a:xfrm>
+            <a:off x="4081326" y="3210825"/>
+            <a:ext cx="1726487" cy="1737920"/>
+          </a:xfrm>
+          <a:prstGeom prst="rect">
+            <a:avLst/>
+          </a:prstGeom>
         </p:spPr>
       </p:pic>
+      <p:sp>
+        <p:nvSpPr>
+          <p:cNvPr id="7" name="TextBox 6">
+            <a:extLst>
+              <a:ext uri="{FF2B5EF4-FFF2-40B4-BE49-F238E27FC236}">
+                <a16:creationId xmlns:a16="http://schemas.microsoft.com/office/drawing/2014/main" id="{C0DD7F67-A854-487E-8705-EAF86F2CBFC1}"/>
+              </a:ext>
+            </a:extLst>
+          </p:cNvPr>
+          <p:cNvSpPr txBox="1"/>
+          <p:nvPr/>
+        </p:nvSpPr>
+        <p:spPr>
+          <a:xfrm>
+            <a:off x="4088405" y="5849922"/>
+            <a:ext cx="1712328" cy="646331"/>
+          </a:xfrm>
+          <a:prstGeom prst="rect">
+            <a:avLst/>
+          </a:prstGeom>
+          <a:noFill/>
+        </p:spPr>
+        <p:txBody>
+          <a:bodyPr wrap="none" rtlCol="0">
+            <a:spAutoFit/>
+          </a:bodyPr>
+          <a:lstStyle/>
+          <a:p>
+            <a:r>
+              <a:rPr lang="en-US" dirty="0"/>
+              <a:t>Filter/Feature </a:t>
+            </a:r>
+          </a:p>
+          <a:p>
+            <a:r>
+              <a:rPr lang="en-US" dirty="0"/>
+              <a:t>Detector</a:t>
+            </a:r>
+          </a:p>
+        </p:txBody>
+      </p:sp>
+      <p:pic>
+        <p:nvPicPr>
+          <p:cNvPr id="8" name="Picture 7">
+            <a:extLst>
+              <a:ext uri="{FF2B5EF4-FFF2-40B4-BE49-F238E27FC236}">
+                <a16:creationId xmlns:a16="http://schemas.microsoft.com/office/drawing/2014/main" id="{2A165E27-9657-4387-99DD-F006FFC99E16}"/>
+              </a:ext>
+            </a:extLst>
+          </p:cNvPr>
+          <p:cNvPicPr>
+            <a:picLocks noChangeAspect="1"/>
+          </p:cNvPicPr>
+          <p:nvPr/>
+        </p:nvPicPr>
+        <p:blipFill>
+          <a:blip r:embed="rId4"/>
+          <a:stretch>
+            <a:fillRect/>
+          </a:stretch>
+        </p:blipFill>
+        <p:spPr>
+          <a:xfrm>
+            <a:off x="6494138" y="2876164"/>
+            <a:ext cx="2391454" cy="2407239"/>
+          </a:xfrm>
+          <a:prstGeom prst="rect">
+            <a:avLst/>
+          </a:prstGeom>
+        </p:spPr>
+      </p:pic>
+      <p:sp>
+        <p:nvSpPr>
+          <p:cNvPr id="10" name="TextBox 9">
+            <a:extLst>
+              <a:ext uri="{FF2B5EF4-FFF2-40B4-BE49-F238E27FC236}">
+                <a16:creationId xmlns:a16="http://schemas.microsoft.com/office/drawing/2014/main" id="{11DFC907-0287-40A8-ADB5-FE933E7A88D6}"/>
+              </a:ext>
+            </a:extLst>
+          </p:cNvPr>
+          <p:cNvSpPr txBox="1"/>
+          <p:nvPr/>
+        </p:nvSpPr>
+        <p:spPr>
+          <a:xfrm>
+            <a:off x="6872974" y="5849922"/>
+            <a:ext cx="1633781" cy="369332"/>
+          </a:xfrm>
+          <a:prstGeom prst="rect">
+            <a:avLst/>
+          </a:prstGeom>
+          <a:noFill/>
+        </p:spPr>
+        <p:txBody>
+          <a:bodyPr wrap="none" rtlCol="0">
+            <a:spAutoFit/>
+          </a:bodyPr>
+          <a:lstStyle/>
+          <a:p>
+            <a:r>
+              <a:rPr lang="en-US" dirty="0"/>
+              <a:t>Feature Map</a:t>
+            </a:r>
+          </a:p>
+        </p:txBody>
+      </p:sp>
+      <p:sp>
+        <p:nvSpPr>
+          <p:cNvPr id="11" name="TextBox 10">
+            <a:extLst>
+              <a:ext uri="{FF2B5EF4-FFF2-40B4-BE49-F238E27FC236}">
+                <a16:creationId xmlns:a16="http://schemas.microsoft.com/office/drawing/2014/main" id="{19D8FBB9-4A72-415E-AE6A-BC29F4485D29}"/>
+              </a:ext>
+            </a:extLst>
+          </p:cNvPr>
+          <p:cNvSpPr txBox="1"/>
+          <p:nvPr/>
+        </p:nvSpPr>
+        <p:spPr>
+          <a:xfrm>
+            <a:off x="5828828" y="3571951"/>
+            <a:ext cx="651140" cy="1015663"/>
+          </a:xfrm>
+          <a:prstGeom prst="rect">
+            <a:avLst/>
+          </a:prstGeom>
+          <a:noFill/>
+        </p:spPr>
+        <p:txBody>
+          <a:bodyPr wrap="none" rtlCol="0">
+            <a:spAutoFit/>
+          </a:bodyPr>
+          <a:lstStyle/>
+          <a:p>
+            <a:r>
+              <a:rPr lang="en-US" sz="6000" dirty="0"/>
+              <a:t>=</a:t>
+            </a:r>
+          </a:p>
+        </p:txBody>
+      </p:sp>
+      <p:pic>
+        <p:nvPicPr>
+          <p:cNvPr id="12" name="Picture 11">
+            <a:extLst>
+              <a:ext uri="{FF2B5EF4-FFF2-40B4-BE49-F238E27FC236}">
+                <a16:creationId xmlns:a16="http://schemas.microsoft.com/office/drawing/2014/main" id="{3B8C3658-4795-40C1-9FED-D3C936D138EB}"/>
+              </a:ext>
+            </a:extLst>
+          </p:cNvPr>
+          <p:cNvPicPr>
+            <a:picLocks noChangeAspect="1"/>
+          </p:cNvPicPr>
+          <p:nvPr/>
+        </p:nvPicPr>
+        <p:blipFill>
+          <a:blip r:embed="rId5"/>
+          <a:stretch>
+            <a:fillRect/>
+          </a:stretch>
+        </p:blipFill>
+        <p:spPr>
+          <a:xfrm>
+            <a:off x="6154398" y="252248"/>
+            <a:ext cx="1930520" cy="1925823"/>
+          </a:xfrm>
+          <a:prstGeom prst="rect">
+            <a:avLst/>
+          </a:prstGeom>
+        </p:spPr>
+      </p:pic>
+      <p:pic>
+        <p:nvPicPr>
+          <p:cNvPr id="13" name="Picture 12">
+            <a:extLst>
+              <a:ext uri="{FF2B5EF4-FFF2-40B4-BE49-F238E27FC236}">
+                <a16:creationId xmlns:a16="http://schemas.microsoft.com/office/drawing/2014/main" id="{6AAF70BB-907A-40CA-A160-B7C214247B44}"/>
+              </a:ext>
+            </a:extLst>
+          </p:cNvPr>
+          <p:cNvPicPr>
+            <a:picLocks noChangeAspect="1"/>
+          </p:cNvPicPr>
+          <p:nvPr/>
+        </p:nvPicPr>
+        <p:blipFill>
+          <a:blip r:embed="rId6"/>
+          <a:stretch>
+            <a:fillRect/>
+          </a:stretch>
+        </p:blipFill>
+        <p:spPr>
+          <a:xfrm>
+            <a:off x="10046048" y="3254855"/>
+            <a:ext cx="1649851" cy="1649851"/>
+          </a:xfrm>
+          <a:prstGeom prst="rect">
+            <a:avLst/>
+          </a:prstGeom>
+        </p:spPr>
+      </p:pic>
+      <p:sp>
+        <p:nvSpPr>
+          <p:cNvPr id="14" name="Arrow: Right 13">
+            <a:extLst>
+              <a:ext uri="{FF2B5EF4-FFF2-40B4-BE49-F238E27FC236}">
+                <a16:creationId xmlns:a16="http://schemas.microsoft.com/office/drawing/2014/main" id="{B24DA29B-ACF4-42D7-AEDE-E816C9594510}"/>
+              </a:ext>
+            </a:extLst>
+          </p:cNvPr>
+          <p:cNvSpPr/>
+          <p:nvPr/>
+        </p:nvSpPr>
+        <p:spPr>
+          <a:xfrm>
+            <a:off x="9144203" y="3862217"/>
+            <a:ext cx="643233" cy="435128"/>
+          </a:xfrm>
+          <a:prstGeom prst="rightArrow">
+            <a:avLst/>
+          </a:prstGeom>
+          <a:solidFill>
+            <a:schemeClr val="tx1"/>
+          </a:solidFill>
+          <a:ln>
+            <a:solidFill>
+              <a:schemeClr val="bg1"/>
+            </a:solidFill>
+          </a:ln>
+        </p:spPr>
+        <p:style>
+          <a:lnRef idx="2">
+            <a:schemeClr val="accent1">
+              <a:shade val="50000"/>
+            </a:schemeClr>
+          </a:lnRef>
+          <a:fillRef idx="1">
+            <a:schemeClr val="accent1"/>
+          </a:fillRef>
+          <a:effectRef idx="0">
+            <a:schemeClr val="accent1"/>
+          </a:effectRef>
+          <a:fontRef idx="minor">
+            <a:schemeClr val="lt1"/>
+          </a:fontRef>
+        </p:style>
+        <p:txBody>
+          <a:bodyPr rtlCol="0" anchor="ctr"/>
+          <a:lstStyle/>
+          <a:p>
+            <a:pPr algn="ctr"/>
+            <a:endParaRPr lang="en-US"/>
+          </a:p>
+        </p:txBody>
+      </p:sp>
+      <p:sp>
+        <p:nvSpPr>
+          <p:cNvPr id="15" name="TextBox 14">
+            <a:extLst>
+              <a:ext uri="{FF2B5EF4-FFF2-40B4-BE49-F238E27FC236}">
+                <a16:creationId xmlns:a16="http://schemas.microsoft.com/office/drawing/2014/main" id="{1D7AB53F-8883-4F59-ACDF-3B1918B3CC5E}"/>
+              </a:ext>
+            </a:extLst>
+          </p:cNvPr>
+          <p:cNvSpPr txBox="1"/>
+          <p:nvPr/>
+        </p:nvSpPr>
+        <p:spPr>
+          <a:xfrm>
+            <a:off x="10046048" y="5849921"/>
+            <a:ext cx="1901483" cy="646331"/>
+          </a:xfrm>
+          <a:prstGeom prst="rect">
+            <a:avLst/>
+          </a:prstGeom>
+          <a:noFill/>
+        </p:spPr>
+        <p:txBody>
+          <a:bodyPr wrap="none" rtlCol="0">
+            <a:spAutoFit/>
+          </a:bodyPr>
+          <a:lstStyle/>
+          <a:p>
+            <a:r>
+              <a:rPr lang="en-US" dirty="0"/>
+              <a:t>Pooled Feature</a:t>
+            </a:r>
+          </a:p>
+          <a:p>
+            <a:r>
+              <a:rPr lang="en-US" dirty="0"/>
+              <a:t>Map</a:t>
+            </a:r>
+          </a:p>
+        </p:txBody>
+      </p:sp>
     </p:spTree>
     <p:extLst>
       <p:ext uri="{BB962C8B-B14F-4D97-AF65-F5344CB8AC3E}">
-        <p14:creationId xmlns:p14="http://schemas.microsoft.com/office/powerpoint/2010/main" val="74226621"/>
+        <p14:creationId xmlns:p14="http://schemas.microsoft.com/office/powerpoint/2010/main" val="2538176219"/>
       </p:ext>
     </p:extLst>
   </p:cSld>

</xml_diff>